<commit_message>
ppt falta uart y main
</commit_message>
<xml_diff>
--- a/PPT/Comunicación serie.pptx
+++ b/PPT/Comunicación serie.pptx
@@ -15408,7 +15408,7 @@
           <a:p>
             <a:r>
               <a:rPr lang="es-AR" dirty="0"/>
-              <a:t>Fernández, Lucero - 57485 </a:t>
+              <a:t>Fernandez, Lucero - 57485 </a:t>
             </a:r>
           </a:p>
           <a:p>
@@ -17180,12 +17180,45 @@
           <a:chExt cx="0" cy="0"/>
         </a:xfrm>
       </p:grpSpPr>
+      <p:sp>
+        <p:nvSpPr>
+          <p:cNvPr id="7" name="Title 3">
+            <a:extLst>
+              <a:ext uri="{FF2B5EF4-FFF2-40B4-BE49-F238E27FC236}">
+                <a16:creationId xmlns:a16="http://schemas.microsoft.com/office/drawing/2014/main" id="{232AF6AD-C5B1-4F78-B40F-4A56E0BFFE0D}"/>
+              </a:ext>
+            </a:extLst>
+          </p:cNvPr>
+          <p:cNvSpPr>
+            <a:spLocks noGrp="1"/>
+          </p:cNvSpPr>
+          <p:nvPr>
+            <p:ph type="ctrTitle"/>
+          </p:nvPr>
+        </p:nvSpPr>
+        <p:spPr>
+          <a:xfrm>
+            <a:off x="4373091" y="238996"/>
+            <a:ext cx="6831673" cy="1086238"/>
+          </a:xfrm>
+        </p:spPr>
+        <p:txBody>
+          <a:bodyPr/>
+          <a:lstStyle/>
+          <a:p>
+            <a:r>
+              <a:rPr lang="es-AR" cap="none" dirty="0"/>
+              <a:t>FXOS8700CQ.h</a:t>
+            </a:r>
+          </a:p>
+        </p:txBody>
+      </p:sp>
       <p:pic>
         <p:nvPicPr>
-          <p:cNvPr id="5" name="Picture 4">
+          <p:cNvPr id="2" name="Picture 1">
             <a:extLst>
               <a:ext uri="{FF2B5EF4-FFF2-40B4-BE49-F238E27FC236}">
-                <a16:creationId xmlns:a16="http://schemas.microsoft.com/office/drawing/2014/main" id="{06C528F2-8CBA-4D27-8AFD-D2D401B151C9}"/>
+                <a16:creationId xmlns:a16="http://schemas.microsoft.com/office/drawing/2014/main" id="{4F8A8A3A-FD07-4AE3-A78E-B404D2452D8C}"/>
               </a:ext>
             </a:extLst>
           </p:cNvPr>
@@ -17202,77 +17235,14 @@
         </p:blipFill>
         <p:spPr>
           <a:xfrm>
-            <a:off x="5546746" y="28472"/>
-            <a:ext cx="6096001" cy="6801055"/>
+            <a:off x="2631141" y="1203157"/>
+            <a:ext cx="6929717" cy="4451685"/>
           </a:xfrm>
           <a:prstGeom prst="rect">
             <a:avLst/>
           </a:prstGeom>
         </p:spPr>
       </p:pic>
-      <p:pic>
-        <p:nvPicPr>
-          <p:cNvPr id="6" name="Picture 5">
-            <a:extLst>
-              <a:ext uri="{FF2B5EF4-FFF2-40B4-BE49-F238E27FC236}">
-                <a16:creationId xmlns:a16="http://schemas.microsoft.com/office/drawing/2014/main" id="{2F5030C9-BC8F-4598-829C-E929536DB030}"/>
-              </a:ext>
-            </a:extLst>
-          </p:cNvPr>
-          <p:cNvPicPr>
-            <a:picLocks noChangeAspect="1"/>
-          </p:cNvPicPr>
-          <p:nvPr/>
-        </p:nvPicPr>
-        <p:blipFill>
-          <a:blip r:embed="rId3"/>
-          <a:stretch>
-            <a:fillRect/>
-          </a:stretch>
-        </p:blipFill>
-        <p:spPr>
-          <a:xfrm>
-            <a:off x="1128962" y="3619351"/>
-            <a:ext cx="3045595" cy="1485042"/>
-          </a:xfrm>
-          <a:prstGeom prst="rect">
-            <a:avLst/>
-          </a:prstGeom>
-        </p:spPr>
-      </p:pic>
-      <p:sp>
-        <p:nvSpPr>
-          <p:cNvPr id="7" name="Title 3">
-            <a:extLst>
-              <a:ext uri="{FF2B5EF4-FFF2-40B4-BE49-F238E27FC236}">
-                <a16:creationId xmlns:a16="http://schemas.microsoft.com/office/drawing/2014/main" id="{232AF6AD-C5B1-4F78-B40F-4A56E0BFFE0D}"/>
-              </a:ext>
-            </a:extLst>
-          </p:cNvPr>
-          <p:cNvSpPr>
-            <a:spLocks noGrp="1"/>
-          </p:cNvSpPr>
-          <p:nvPr>
-            <p:ph type="title"/>
-          </p:nvPr>
-        </p:nvSpPr>
-        <p:spPr>
-          <a:xfrm>
-            <a:off x="549253" y="1752749"/>
-            <a:ext cx="4542700" cy="1485900"/>
-          </a:xfrm>
-        </p:spPr>
-        <p:txBody>
-          <a:bodyPr/>
-          <a:lstStyle/>
-          <a:p>
-            <a:r>
-              <a:rPr lang="es-AR" dirty="0"/>
-              <a:t>FXOS8700CQ.h</a:t>
-            </a:r>
-          </a:p>
-        </p:txBody>
-      </p:sp>
     </p:spTree>
     <p:extLst>
       <p:ext uri="{BB962C8B-B14F-4D97-AF65-F5344CB8AC3E}">

</xml_diff>

<commit_message>
presentacion terminada, dale que ya estamos
</commit_message>
<xml_diff>
--- a/PPT/Comunicación serie.pptx
+++ b/PPT/Comunicación serie.pptx
@@ -11,11 +11,12 @@
     <p:sldId id="260" r:id="rId5"/>
     <p:sldId id="261" r:id="rId6"/>
     <p:sldId id="262" r:id="rId7"/>
-    <p:sldId id="263" r:id="rId8"/>
-    <p:sldId id="264" r:id="rId9"/>
-    <p:sldId id="267" r:id="rId10"/>
-    <p:sldId id="265" r:id="rId11"/>
-    <p:sldId id="266" r:id="rId12"/>
+    <p:sldId id="266" r:id="rId8"/>
+    <p:sldId id="263" r:id="rId9"/>
+    <p:sldId id="264" r:id="rId10"/>
+    <p:sldId id="267" r:id="rId11"/>
+    <p:sldId id="265" r:id="rId12"/>
+    <p:sldId id="268" r:id="rId13"/>
   </p:sldIdLst>
   <p:sldSz cx="12192000" cy="6858000"/>
   <p:notesSz cx="6858000" cy="9144000"/>
@@ -3058,7 +3059,7 @@
         <a:p>
           <a:r>
             <a:rPr lang="es-AR" dirty="0"/>
-            <a:t>SYSTICK</a:t>
+            <a:t>GPIO</a:t>
           </a:r>
         </a:p>
       </dgm:t>
@@ -3379,6 +3380,64 @@
         </a:p>
       </dgm:t>
     </dgm:pt>
+    <dgm:pt modelId="{4F534C62-390B-458F-B480-8C2BD5BC7612}">
+      <dgm:prSet/>
+      <dgm:spPr/>
+      <dgm:t>
+        <a:bodyPr/>
+        <a:lstStyle/>
+        <a:p>
+          <a:r>
+            <a:rPr lang="es-AR" dirty="0"/>
+            <a:t>TIMER</a:t>
+          </a:r>
+        </a:p>
+      </dgm:t>
+    </dgm:pt>
+    <dgm:pt modelId="{2365B1BB-E64C-4F44-A1AB-DE852EA80CDF}" type="parTrans" cxnId="{8263A098-8DF1-46D5-AEF4-E7017BFC8CDB}">
+      <dgm:prSet/>
+      <dgm:spPr/>
+      <dgm:t>
+        <a:bodyPr/>
+        <a:lstStyle/>
+        <a:p>
+          <a:endParaRPr lang="es-AR"/>
+        </a:p>
+      </dgm:t>
+    </dgm:pt>
+    <dgm:pt modelId="{D15F2CA4-E27D-4EFE-B3E5-E2CFC341EE58}" type="sibTrans" cxnId="{8263A098-8DF1-46D5-AEF4-E7017BFC8CDB}">
+      <dgm:prSet/>
+      <dgm:spPr/>
+      <dgm:t>
+        <a:bodyPr/>
+        <a:lstStyle/>
+        <a:p>
+          <a:endParaRPr lang="es-AR"/>
+        </a:p>
+      </dgm:t>
+    </dgm:pt>
+    <dgm:pt modelId="{1177EB47-D773-481F-8FF3-A903D2FAF107}">
+      <dgm:prSet/>
+      <dgm:spPr/>
+      <dgm:t>
+        <a:bodyPr/>
+        <a:lstStyle/>
+        <a:p>
+          <a:r>
+            <a:rPr lang="es-AR" dirty="0"/>
+            <a:t>SYSTICK</a:t>
+          </a:r>
+        </a:p>
+      </dgm:t>
+    </dgm:pt>
+    <dgm:pt modelId="{3138233F-D5A9-4426-BCCA-7783F63A03CF}" type="sibTrans" cxnId="{3B478860-8339-40B9-8991-AE7FB99C2156}">
+      <dgm:prSet/>
+      <dgm:spPr/>
+    </dgm:pt>
+    <dgm:pt modelId="{AFE5FB83-E8AB-443E-8259-AD6D6FA57484}" type="parTrans" cxnId="{3B478860-8339-40B9-8991-AE7FB99C2156}">
+      <dgm:prSet/>
+      <dgm:spPr/>
+    </dgm:pt>
     <dgm:pt modelId="{C647C14C-60E2-48E5-85A4-92CF88C6F009}" type="pres">
       <dgm:prSet presAssocID="{1C5F8750-0E8D-4A4F-A5C4-6A02757B2CEE}" presName="mainComposite" presStyleCnt="0">
         <dgm:presLayoutVars>
@@ -3437,8 +3496,40 @@
       <dgm:prSet presAssocID="{35DCDA67-F2A2-441C-AE5D-C1B198AC0662}" presName="hierChild3" presStyleCnt="0"/>
       <dgm:spPr/>
     </dgm:pt>
+    <dgm:pt modelId="{6BED99B3-E35D-4479-BD8F-C89911CBA7D9}" type="pres">
+      <dgm:prSet presAssocID="{2365B1BB-E64C-4F44-A1AB-DE852EA80CDF}" presName="Name19" presStyleLbl="parChTrans1D3" presStyleIdx="0" presStyleCnt="5"/>
+      <dgm:spPr/>
+    </dgm:pt>
+    <dgm:pt modelId="{37DA590A-EC83-4F01-B5EE-14F5DB4C53FE}" type="pres">
+      <dgm:prSet presAssocID="{4F534C62-390B-458F-B480-8C2BD5BC7612}" presName="Name21" presStyleCnt="0"/>
+      <dgm:spPr/>
+    </dgm:pt>
+    <dgm:pt modelId="{ABF86001-E192-4808-9A98-9489CE78A520}" type="pres">
+      <dgm:prSet presAssocID="{4F534C62-390B-458F-B480-8C2BD5BC7612}" presName="level2Shape" presStyleLbl="node3" presStyleIdx="0" presStyleCnt="5"/>
+      <dgm:spPr/>
+    </dgm:pt>
+    <dgm:pt modelId="{A57B7B44-3E4C-4B57-8449-BFA97DBBEAD8}" type="pres">
+      <dgm:prSet presAssocID="{4F534C62-390B-458F-B480-8C2BD5BC7612}" presName="hierChild3" presStyleCnt="0"/>
+      <dgm:spPr/>
+    </dgm:pt>
+    <dgm:pt modelId="{FBB1584B-E4A3-46AD-B9FF-73233513DEC5}" type="pres">
+      <dgm:prSet presAssocID="{AFE5FB83-E8AB-443E-8259-AD6D6FA57484}" presName="Name19" presStyleLbl="parChTrans1D4" presStyleIdx="0" presStyleCnt="7"/>
+      <dgm:spPr/>
+    </dgm:pt>
+    <dgm:pt modelId="{A54E2C43-0C62-4198-8BEA-4CA1935FF591}" type="pres">
+      <dgm:prSet presAssocID="{1177EB47-D773-481F-8FF3-A903D2FAF107}" presName="Name21" presStyleCnt="0"/>
+      <dgm:spPr/>
+    </dgm:pt>
+    <dgm:pt modelId="{692E1C15-5EDE-45B5-A9AC-7A0D80148EC4}" type="pres">
+      <dgm:prSet presAssocID="{1177EB47-D773-481F-8FF3-A903D2FAF107}" presName="level2Shape" presStyleLbl="node4" presStyleIdx="0" presStyleCnt="7"/>
+      <dgm:spPr/>
+    </dgm:pt>
+    <dgm:pt modelId="{5EAD126F-0496-4AAF-82E4-5CF5CF0D0EDA}" type="pres">
+      <dgm:prSet presAssocID="{1177EB47-D773-481F-8FF3-A903D2FAF107}" presName="hierChild3" presStyleCnt="0"/>
+      <dgm:spPr/>
+    </dgm:pt>
     <dgm:pt modelId="{53BE28EF-99A8-45D2-A439-B1144FBC3954}" type="pres">
-      <dgm:prSet presAssocID="{7B337E52-DD2F-44E8-9ED5-365B87D9FED1}" presName="Name19" presStyleLbl="parChTrans1D3" presStyleIdx="0" presStyleCnt="4"/>
+      <dgm:prSet presAssocID="{7B337E52-DD2F-44E8-9ED5-365B87D9FED1}" presName="Name19" presStyleLbl="parChTrans1D3" presStyleIdx="1" presStyleCnt="5"/>
       <dgm:spPr/>
     </dgm:pt>
     <dgm:pt modelId="{D3FD43ED-49D9-4CB5-A2F0-DFC7987DD202}" type="pres">
@@ -3446,7 +3537,7 @@
       <dgm:spPr/>
     </dgm:pt>
     <dgm:pt modelId="{C24AA9F1-E100-43C5-9B3E-E49BBE5DF731}" type="pres">
-      <dgm:prSet presAssocID="{001622B8-067A-4ACE-8911-1AA26B934B71}" presName="level2Shape" presStyleLbl="node3" presStyleIdx="0" presStyleCnt="4" custLinFactNeighborX="-660"/>
+      <dgm:prSet presAssocID="{001622B8-067A-4ACE-8911-1AA26B934B71}" presName="level2Shape" presStyleLbl="node3" presStyleIdx="1" presStyleCnt="5" custLinFactNeighborX="-660"/>
       <dgm:spPr/>
     </dgm:pt>
     <dgm:pt modelId="{85A47341-493F-4C78-B925-6D17CBFED368}" type="pres">
@@ -3454,7 +3545,7 @@
       <dgm:spPr/>
     </dgm:pt>
     <dgm:pt modelId="{E6F5C1DA-D308-408B-88C1-7DE98E99F690}" type="pres">
-      <dgm:prSet presAssocID="{55C08119-F190-4569-BB1D-4D4C7A2B693E}" presName="Name19" presStyleLbl="parChTrans1D4" presStyleIdx="0" presStyleCnt="6"/>
+      <dgm:prSet presAssocID="{55C08119-F190-4569-BB1D-4D4C7A2B693E}" presName="Name19" presStyleLbl="parChTrans1D4" presStyleIdx="1" presStyleCnt="7"/>
       <dgm:spPr/>
     </dgm:pt>
     <dgm:pt modelId="{8F5D01B4-3E5A-4BD4-B68D-CC352A4E8257}" type="pres">
@@ -3462,7 +3553,7 @@
       <dgm:spPr/>
     </dgm:pt>
     <dgm:pt modelId="{EA7FACE5-B0A2-41B9-9E88-2A0B6E6837A7}" type="pres">
-      <dgm:prSet presAssocID="{53BD6231-3DFE-431F-8D0C-C2EE5F431215}" presName="level2Shape" presStyleLbl="node4" presStyleIdx="0" presStyleCnt="6"/>
+      <dgm:prSet presAssocID="{53BD6231-3DFE-431F-8D0C-C2EE5F431215}" presName="level2Shape" presStyleLbl="node4" presStyleIdx="1" presStyleCnt="7"/>
       <dgm:spPr/>
     </dgm:pt>
     <dgm:pt modelId="{82E4EAC8-6C7E-4BD1-AF27-FEF63E238D7B}" type="pres">
@@ -3470,7 +3561,7 @@
       <dgm:spPr/>
     </dgm:pt>
     <dgm:pt modelId="{D2FA8DCC-89A3-4CB1-9FF9-7F8B664B0AF9}" type="pres">
-      <dgm:prSet presAssocID="{84C7FE82-CB25-4ECD-9CE0-264765FA62D1}" presName="Name19" presStyleLbl="parChTrans1D4" presStyleIdx="1" presStyleCnt="6"/>
+      <dgm:prSet presAssocID="{84C7FE82-CB25-4ECD-9CE0-264765FA62D1}" presName="Name19" presStyleLbl="parChTrans1D4" presStyleIdx="2" presStyleCnt="7"/>
       <dgm:spPr/>
     </dgm:pt>
     <dgm:pt modelId="{2B314F4B-35F2-4267-A97E-CAD08F585A27}" type="pres">
@@ -3478,7 +3569,7 @@
       <dgm:spPr/>
     </dgm:pt>
     <dgm:pt modelId="{693E7B0F-4C3D-48FF-A291-A297AD09F19A}" type="pres">
-      <dgm:prSet presAssocID="{CFE7097C-8D2B-4D79-A5D5-84D08B065AD4}" presName="level2Shape" presStyleLbl="node4" presStyleIdx="1" presStyleCnt="6"/>
+      <dgm:prSet presAssocID="{CFE7097C-8D2B-4D79-A5D5-84D08B065AD4}" presName="level2Shape" presStyleLbl="node4" presStyleIdx="2" presStyleCnt="7"/>
       <dgm:spPr/>
     </dgm:pt>
     <dgm:pt modelId="{24E3E993-3795-4816-83E6-9D2D429CDF86}" type="pres">
@@ -3486,7 +3577,7 @@
       <dgm:spPr/>
     </dgm:pt>
     <dgm:pt modelId="{DDEF067D-8035-4EE8-B26D-F9EF3FCB2EBB}" type="pres">
-      <dgm:prSet presAssocID="{C285AA89-3DDC-4450-9A7F-149023CB6A38}" presName="Name19" presStyleLbl="parChTrans1D3" presStyleIdx="1" presStyleCnt="4"/>
+      <dgm:prSet presAssocID="{C285AA89-3DDC-4450-9A7F-149023CB6A38}" presName="Name19" presStyleLbl="parChTrans1D3" presStyleIdx="2" presStyleCnt="5"/>
       <dgm:spPr/>
     </dgm:pt>
     <dgm:pt modelId="{5C701B20-89F4-4F50-9BD5-3E008C6D7DE6}" type="pres">
@@ -3494,7 +3585,7 @@
       <dgm:spPr/>
     </dgm:pt>
     <dgm:pt modelId="{C506A8BA-439E-4716-BD26-721A6F281A37}" type="pres">
-      <dgm:prSet presAssocID="{DEBFFABF-82B9-4D25-8AD5-D3D639130002}" presName="level2Shape" presStyleLbl="node3" presStyleIdx="1" presStyleCnt="4" custScaleX="119974" custLinFactNeighborX="-3807" custLinFactNeighborY="-562"/>
+      <dgm:prSet presAssocID="{DEBFFABF-82B9-4D25-8AD5-D3D639130002}" presName="level2Shape" presStyleLbl="node3" presStyleIdx="2" presStyleCnt="5" custScaleX="119974" custLinFactNeighborX="-3807" custLinFactNeighborY="-562"/>
       <dgm:spPr/>
     </dgm:pt>
     <dgm:pt modelId="{0D14266D-155E-47D2-BD04-D1ADB411484B}" type="pres">
@@ -3502,7 +3593,7 @@
       <dgm:spPr/>
     </dgm:pt>
     <dgm:pt modelId="{D15C5AB9-F1E9-4D5E-85C9-5C93CA672A4C}" type="pres">
-      <dgm:prSet presAssocID="{CA09B458-A59A-42E9-823E-CEA240B29164}" presName="Name19" presStyleLbl="parChTrans1D4" presStyleIdx="2" presStyleCnt="6"/>
+      <dgm:prSet presAssocID="{CA09B458-A59A-42E9-823E-CEA240B29164}" presName="Name19" presStyleLbl="parChTrans1D4" presStyleIdx="3" presStyleCnt="7"/>
       <dgm:spPr/>
     </dgm:pt>
     <dgm:pt modelId="{E8E838FA-19ED-40BF-9663-79F2E95A96F0}" type="pres">
@@ -3510,7 +3601,7 @@
       <dgm:spPr/>
     </dgm:pt>
     <dgm:pt modelId="{1F02E85D-CEC4-408D-AADB-4E14B7734CE4}" type="pres">
-      <dgm:prSet presAssocID="{BEEE473B-2EC8-470A-9E28-03E623F722B2}" presName="level2Shape" presStyleLbl="node4" presStyleIdx="2" presStyleCnt="6"/>
+      <dgm:prSet presAssocID="{BEEE473B-2EC8-470A-9E28-03E623F722B2}" presName="level2Shape" presStyleLbl="node4" presStyleIdx="3" presStyleCnt="7"/>
       <dgm:spPr/>
     </dgm:pt>
     <dgm:pt modelId="{0DDA1025-F861-46DE-9999-4C9FF60F2BA1}" type="pres">
@@ -3518,7 +3609,7 @@
       <dgm:spPr/>
     </dgm:pt>
     <dgm:pt modelId="{2B44D44D-9C15-4BE4-8857-6902DD216E02}" type="pres">
-      <dgm:prSet presAssocID="{AEF768B3-89BD-4493-B753-D5C7E3F86037}" presName="Name19" presStyleLbl="parChTrans1D4" presStyleIdx="3" presStyleCnt="6"/>
+      <dgm:prSet presAssocID="{AEF768B3-89BD-4493-B753-D5C7E3F86037}" presName="Name19" presStyleLbl="parChTrans1D4" presStyleIdx="4" presStyleCnt="7"/>
       <dgm:spPr/>
     </dgm:pt>
     <dgm:pt modelId="{52E0AE4D-5240-4116-8871-F00A2F071C25}" type="pres">
@@ -3526,7 +3617,7 @@
       <dgm:spPr/>
     </dgm:pt>
     <dgm:pt modelId="{03CEC701-59F7-4F6F-A2FB-6D1193C6C0E9}" type="pres">
-      <dgm:prSet presAssocID="{E116835A-3D10-450B-9413-E1B97894FFA3}" presName="level2Shape" presStyleLbl="node4" presStyleIdx="3" presStyleCnt="6" custLinFactNeighborX="-3823" custLinFactNeighborY="-3186"/>
+      <dgm:prSet presAssocID="{E116835A-3D10-450B-9413-E1B97894FFA3}" presName="level2Shape" presStyleLbl="node4" presStyleIdx="4" presStyleCnt="7" custLinFactNeighborX="-3823" custLinFactNeighborY="-3186"/>
       <dgm:spPr/>
     </dgm:pt>
     <dgm:pt modelId="{70C641D7-008F-491D-A8A1-389516750A5F}" type="pres">
@@ -3550,7 +3641,7 @@
       <dgm:spPr/>
     </dgm:pt>
     <dgm:pt modelId="{6DFBC8DC-FB04-4552-ACB4-2C723637561B}" type="pres">
-      <dgm:prSet presAssocID="{14CBFDCC-3ECF-4077-AAFC-9035D3532054}" presName="Name19" presStyleLbl="parChTrans1D3" presStyleIdx="2" presStyleCnt="4"/>
+      <dgm:prSet presAssocID="{14CBFDCC-3ECF-4077-AAFC-9035D3532054}" presName="Name19" presStyleLbl="parChTrans1D3" presStyleIdx="3" presStyleCnt="5"/>
       <dgm:spPr/>
     </dgm:pt>
     <dgm:pt modelId="{01B1FE0B-F591-4A2D-B9D9-4DFCE938EC84}" type="pres">
@@ -3558,7 +3649,7 @@
       <dgm:spPr/>
     </dgm:pt>
     <dgm:pt modelId="{7C0EA656-1D18-4980-86E2-83309EF67A1B}" type="pres">
-      <dgm:prSet presAssocID="{5CA15CE3-8396-42E1-8E7E-BD11A58851E2}" presName="level2Shape" presStyleLbl="node3" presStyleIdx="2" presStyleCnt="4" custLinFactNeighborX="2683" custLinFactNeighborY="-1341"/>
+      <dgm:prSet presAssocID="{5CA15CE3-8396-42E1-8E7E-BD11A58851E2}" presName="level2Shape" presStyleLbl="node3" presStyleIdx="3" presStyleCnt="5" custLinFactNeighborX="2683" custLinFactNeighborY="-1341"/>
       <dgm:spPr/>
     </dgm:pt>
     <dgm:pt modelId="{7EF65181-3316-4D40-8098-EFE2CDDA0653}" type="pres">
@@ -3566,7 +3657,7 @@
       <dgm:spPr/>
     </dgm:pt>
     <dgm:pt modelId="{190E5C43-FF52-41EF-BC65-4C3846DF4B2F}" type="pres">
-      <dgm:prSet presAssocID="{27B0B7D4-9290-4FFB-8E4F-E55C7EC9F8B5}" presName="Name19" presStyleLbl="parChTrans1D4" presStyleIdx="4" presStyleCnt="6"/>
+      <dgm:prSet presAssocID="{27B0B7D4-9290-4FFB-8E4F-E55C7EC9F8B5}" presName="Name19" presStyleLbl="parChTrans1D4" presStyleIdx="5" presStyleCnt="7"/>
       <dgm:spPr/>
     </dgm:pt>
     <dgm:pt modelId="{37FB32C3-A5F1-4812-A1A1-DE1AA871D2FD}" type="pres">
@@ -3574,7 +3665,7 @@
       <dgm:spPr/>
     </dgm:pt>
     <dgm:pt modelId="{403A2617-6E68-42B4-BEB9-915729DD91B2}" type="pres">
-      <dgm:prSet presAssocID="{F66CC7BD-674A-437D-8C62-29898B13049D}" presName="level2Shape" presStyleLbl="node4" presStyleIdx="4" presStyleCnt="6"/>
+      <dgm:prSet presAssocID="{F66CC7BD-674A-437D-8C62-29898B13049D}" presName="level2Shape" presStyleLbl="node4" presStyleIdx="5" presStyleCnt="7"/>
       <dgm:spPr/>
     </dgm:pt>
     <dgm:pt modelId="{E6CA9CB2-9465-4706-AB82-6534488FC1B5}" type="pres">
@@ -3582,7 +3673,7 @@
       <dgm:spPr/>
     </dgm:pt>
     <dgm:pt modelId="{86087C67-4375-477E-84D1-836C1F14C793}" type="pres">
-      <dgm:prSet presAssocID="{441A3D14-7823-4933-A226-6CEE16869DD4}" presName="Name19" presStyleLbl="parChTrans1D3" presStyleIdx="3" presStyleCnt="4"/>
+      <dgm:prSet presAssocID="{441A3D14-7823-4933-A226-6CEE16869DD4}" presName="Name19" presStyleLbl="parChTrans1D3" presStyleIdx="4" presStyleCnt="5"/>
       <dgm:spPr/>
     </dgm:pt>
     <dgm:pt modelId="{85B79B7E-F00E-48C7-AF60-37DCF3CD811A}" type="pres">
@@ -3590,7 +3681,7 @@
       <dgm:spPr/>
     </dgm:pt>
     <dgm:pt modelId="{A445E83A-B1D7-4754-AB40-1BD356E2B23A}" type="pres">
-      <dgm:prSet presAssocID="{540823D0-D4AA-438F-B805-D3CA6D4539F8}" presName="level2Shape" presStyleLbl="node3" presStyleIdx="3" presStyleCnt="4" custLinFactNeighborX="-875" custLinFactNeighborY="-10421"/>
+      <dgm:prSet presAssocID="{540823D0-D4AA-438F-B805-D3CA6D4539F8}" presName="level2Shape" presStyleLbl="node3" presStyleIdx="4" presStyleCnt="5" custLinFactNeighborX="-875" custLinFactNeighborY="-10421"/>
       <dgm:spPr/>
     </dgm:pt>
     <dgm:pt modelId="{B24DE3F9-9CB7-4F27-BB97-71205C9A2479}" type="pres">
@@ -3598,7 +3689,7 @@
       <dgm:spPr/>
     </dgm:pt>
     <dgm:pt modelId="{56CF0D79-9B69-422E-B55F-8C1B0E2FBF1A}" type="pres">
-      <dgm:prSet presAssocID="{33AA2D47-1000-479B-B8DD-8B7CFD50AA2C}" presName="Name19" presStyleLbl="parChTrans1D4" presStyleIdx="5" presStyleCnt="6"/>
+      <dgm:prSet presAssocID="{33AA2D47-1000-479B-B8DD-8B7CFD50AA2C}" presName="Name19" presStyleLbl="parChTrans1D4" presStyleIdx="6" presStyleCnt="7"/>
       <dgm:spPr/>
     </dgm:pt>
     <dgm:pt modelId="{0E1F0822-5D6C-4319-98E2-F162567476DA}" type="pres">
@@ -3606,7 +3697,7 @@
       <dgm:spPr/>
     </dgm:pt>
     <dgm:pt modelId="{EFADDF6B-06F5-45B8-838D-F3A345604137}" type="pres">
-      <dgm:prSet presAssocID="{3FA3C445-9E1D-45B1-AB41-19681A34813A}" presName="level2Shape" presStyleLbl="node4" presStyleIdx="5" presStyleCnt="6"/>
+      <dgm:prSet presAssocID="{3FA3C445-9E1D-45B1-AB41-19681A34813A}" presName="level2Shape" presStyleLbl="node4" presStyleIdx="6" presStyleCnt="7"/>
       <dgm:spPr/>
     </dgm:pt>
     <dgm:pt modelId="{A25BEABA-2D8D-4C41-B23F-474AF0946337}" type="pres">
@@ -3620,43 +3711,49 @@
   </dgm:ptLst>
   <dgm:cxnLst>
     <dgm:cxn modelId="{9C655402-4D62-4C5E-8862-34551698FE28}" type="presOf" srcId="{35DCDA67-F2A2-441C-AE5D-C1B198AC0662}" destId="{0ECD015A-E51F-4E92-93F8-42CA82FE8288}" srcOrd="0" destOrd="0" presId="urn:microsoft.com/office/officeart/2005/8/layout/hierarchy6"/>
-    <dgm:cxn modelId="{D612BB0F-71F7-43BD-8055-CABB22335B04}" type="presOf" srcId="{CFE7097C-8D2B-4D79-A5D5-84D08B065AD4}" destId="{693E7B0F-4C3D-48FF-A291-A297AD09F19A}" srcOrd="0" destOrd="0" presId="urn:microsoft.com/office/officeart/2005/8/layout/hierarchy6"/>
-    <dgm:cxn modelId="{25C18B10-BA99-4144-9327-3CE193268AD5}" srcId="{35DCDA67-F2A2-441C-AE5D-C1B198AC0662}" destId="{DEBFFABF-82B9-4D25-8AD5-D3D639130002}" srcOrd="1" destOrd="0" parTransId="{C285AA89-3DDC-4450-9A7F-149023CB6A38}" sibTransId="{BBFA5F37-ED43-47CE-BC61-3C61975DD27E}"/>
+    <dgm:cxn modelId="{95D5850A-C725-4BF9-8D49-CD1462B93733}" type="presOf" srcId="{CFE7097C-8D2B-4D79-A5D5-84D08B065AD4}" destId="{693E7B0F-4C3D-48FF-A291-A297AD09F19A}" srcOrd="0" destOrd="0" presId="urn:microsoft.com/office/officeart/2005/8/layout/hierarchy6"/>
+    <dgm:cxn modelId="{25C18B10-BA99-4144-9327-3CE193268AD5}" srcId="{35DCDA67-F2A2-441C-AE5D-C1B198AC0662}" destId="{DEBFFABF-82B9-4D25-8AD5-D3D639130002}" srcOrd="2" destOrd="0" parTransId="{C285AA89-3DDC-4450-9A7F-149023CB6A38}" sibTransId="{BBFA5F37-ED43-47CE-BC61-3C61975DD27E}"/>
+    <dgm:cxn modelId="{FBFAB422-6523-460C-80BE-04C9E7A26610}" type="presOf" srcId="{CA09B458-A59A-42E9-823E-CEA240B29164}" destId="{D15C5AB9-F1E9-4D5E-85C9-5C93CA672A4C}" srcOrd="0" destOrd="0" presId="urn:microsoft.com/office/officeart/2005/8/layout/hierarchy6"/>
     <dgm:cxn modelId="{5275E036-94EA-4766-81F6-96033E334A09}" srcId="{DEBFFABF-82B9-4D25-8AD5-D3D639130002}" destId="{BEEE473B-2EC8-470A-9E28-03E623F722B2}" srcOrd="0" destOrd="0" parTransId="{CA09B458-A59A-42E9-823E-CEA240B29164}" sibTransId="{46EA9050-A58E-42AE-80FB-F8F237BBD6B0}"/>
     <dgm:cxn modelId="{B9669E3A-3379-47B8-B7B5-0C722AAF1398}" type="presOf" srcId="{33AA2D47-1000-479B-B8DD-8B7CFD50AA2C}" destId="{56CF0D79-9B69-422E-B55F-8C1B0E2FBF1A}" srcOrd="0" destOrd="0" presId="urn:microsoft.com/office/officeart/2005/8/layout/hierarchy6"/>
-    <dgm:cxn modelId="{8C3C563B-3F89-4C3C-99C7-53B2F08A96D8}" type="presOf" srcId="{AEF768B3-89BD-4493-B753-D5C7E3F86037}" destId="{2B44D44D-9C15-4BE4-8857-6902DD216E02}" srcOrd="0" destOrd="0" presId="urn:microsoft.com/office/officeart/2005/8/layout/hierarchy6"/>
     <dgm:cxn modelId="{E6702C3E-B010-4296-AEEE-E1BB5FA9C3D1}" type="presOf" srcId="{675114A4-4D40-4091-9275-9C8175883DB4}" destId="{41AB122B-081A-4865-AD38-E3670CB221C3}" srcOrd="0" destOrd="0" presId="urn:microsoft.com/office/officeart/2005/8/layout/hierarchy6"/>
-    <dgm:cxn modelId="{99B13463-DFFE-402D-A231-37328C63A7B0}" type="presOf" srcId="{55C08119-F190-4569-BB1D-4D4C7A2B693E}" destId="{E6F5C1DA-D308-408B-88C1-7DE98E99F690}" srcOrd="0" destOrd="0" presId="urn:microsoft.com/office/officeart/2005/8/layout/hierarchy6"/>
-    <dgm:cxn modelId="{1DB2BA4B-C406-43F5-ADDB-E24CEE1369B8}" type="presOf" srcId="{7B337E52-DD2F-44E8-9ED5-365B87D9FED1}" destId="{53BE28EF-99A8-45D2-A439-B1144FBC3954}" srcOrd="0" destOrd="0" presId="urn:microsoft.com/office/officeart/2005/8/layout/hierarchy6"/>
+    <dgm:cxn modelId="{3B478860-8339-40B9-8991-AE7FB99C2156}" srcId="{4F534C62-390B-458F-B480-8C2BD5BC7612}" destId="{1177EB47-D773-481F-8FF3-A903D2FAF107}" srcOrd="0" destOrd="0" parTransId="{AFE5FB83-E8AB-443E-8259-AD6D6FA57484}" sibTransId="{3138233F-D5A9-4426-BCCA-7783F63A03CF}"/>
+    <dgm:cxn modelId="{D3495261-8D8B-4B83-95DB-5D5971A8440E}" type="presOf" srcId="{001622B8-067A-4ACE-8911-1AA26B934B71}" destId="{C24AA9F1-E100-43C5-9B3E-E49BBE5DF731}" srcOrd="0" destOrd="0" presId="urn:microsoft.com/office/officeart/2005/8/layout/hierarchy6"/>
+    <dgm:cxn modelId="{DE548547-2712-4EC4-B4D2-C48AD61A9589}" type="presOf" srcId="{2365B1BB-E64C-4F44-A1AB-DE852EA80CDF}" destId="{6BED99B3-E35D-4479-BD8F-C89911CBA7D9}" srcOrd="0" destOrd="0" presId="urn:microsoft.com/office/officeart/2005/8/layout/hierarchy6"/>
     <dgm:cxn modelId="{8F84316C-D7CF-4E70-A84F-FC3AEF7A98DD}" srcId="{1C5F8750-0E8D-4A4F-A5C4-6A02757B2CEE}" destId="{9A3D543D-1E9A-4BE5-BFBC-B65722739982}" srcOrd="0" destOrd="0" parTransId="{9B09A68A-FA35-4BB2-B59F-0D5048C372BC}" sibTransId="{4E033150-6172-41B8-A447-633A4A116347}"/>
     <dgm:cxn modelId="{6E77064D-F778-4D34-BE87-8943DB3A0BEC}" srcId="{9A3D543D-1E9A-4BE5-BFBC-B65722739982}" destId="{5A9D0339-AA51-434F-8B6C-60F99E3633CF}" srcOrd="1" destOrd="0" parTransId="{5A2D30D4-EEF4-4274-A404-AB129065637F}" sibTransId="{CEC8408D-1C1F-4517-8C11-F42FD84E8BAB}"/>
     <dgm:cxn modelId="{63A89A4E-2CBD-4E12-812B-B8472175D000}" type="presOf" srcId="{F66CC7BD-674A-437D-8C62-29898B13049D}" destId="{403A2617-6E68-42B4-BEB9-915729DD91B2}" srcOrd="0" destOrd="0" presId="urn:microsoft.com/office/officeart/2005/8/layout/hierarchy6"/>
+    <dgm:cxn modelId="{63F3194F-6791-4428-9841-6322D8BCEB96}" type="presOf" srcId="{AEF768B3-89BD-4493-B753-D5C7E3F86037}" destId="{2B44D44D-9C15-4BE4-8857-6902DD216E02}" srcOrd="0" destOrd="0" presId="urn:microsoft.com/office/officeart/2005/8/layout/hierarchy6"/>
     <dgm:cxn modelId="{7FB98C4F-DCCA-4C59-A3BF-C3B8534B4C0E}" srcId="{5A9D0339-AA51-434F-8B6C-60F99E3633CF}" destId="{5CA15CE3-8396-42E1-8E7E-BD11A58851E2}" srcOrd="0" destOrd="0" parTransId="{14CBFDCC-3ECF-4077-AAFC-9035D3532054}" sibTransId="{4EF2F922-12E7-4FD4-81DA-E3CD0818CD32}"/>
     <dgm:cxn modelId="{3FDF2D53-B628-4187-A108-E70970B62BCD}" type="presOf" srcId="{3FA3C445-9E1D-45B1-AB41-19681A34813A}" destId="{EFADDF6B-06F5-45B8-838D-F3A345604137}" srcOrd="0" destOrd="0" presId="urn:microsoft.com/office/officeart/2005/8/layout/hierarchy6"/>
-    <dgm:cxn modelId="{22D75C54-D61D-4CFA-8DC6-21D5B70F2876}" type="presOf" srcId="{53BD6231-3DFE-431F-8D0C-C2EE5F431215}" destId="{EA7FACE5-B0A2-41B9-9E88-2A0B6E6837A7}" srcOrd="0" destOrd="0" presId="urn:microsoft.com/office/officeart/2005/8/layout/hierarchy6"/>
-    <dgm:cxn modelId="{3BBF5554-DF7B-4357-89C8-D55160EC3B44}" type="presOf" srcId="{BEEE473B-2EC8-470A-9E28-03E623F722B2}" destId="{1F02E85D-CEC4-408D-AADB-4E14B7734CE4}" srcOrd="0" destOrd="0" presId="urn:microsoft.com/office/officeart/2005/8/layout/hierarchy6"/>
     <dgm:cxn modelId="{EC0C3E78-9120-4AF3-8F4C-A02234D887E3}" type="presOf" srcId="{5A2D30D4-EEF4-4274-A404-AB129065637F}" destId="{6D500FE4-6E88-4115-B204-2A401C1E43A0}" srcOrd="0" destOrd="0" presId="urn:microsoft.com/office/officeart/2005/8/layout/hierarchy6"/>
+    <dgm:cxn modelId="{21A3CB80-EAE5-4BE8-B222-0BC5736FF6AF}" type="presOf" srcId="{4F534C62-390B-458F-B480-8C2BD5BC7612}" destId="{ABF86001-E192-4808-9A98-9489CE78A520}" srcOrd="0" destOrd="0" presId="urn:microsoft.com/office/officeart/2005/8/layout/hierarchy6"/>
+    <dgm:cxn modelId="{35D62181-1ACD-472B-B46C-EC749C795426}" type="presOf" srcId="{AFE5FB83-E8AB-443E-8259-AD6D6FA57484}" destId="{FBB1584B-E4A3-46AD-B9FF-73233513DEC5}" srcOrd="0" destOrd="0" presId="urn:microsoft.com/office/officeart/2005/8/layout/hierarchy6"/>
     <dgm:cxn modelId="{639A4D89-A229-4918-9664-A2D46026618B}" type="presOf" srcId="{9A3D543D-1E9A-4BE5-BFBC-B65722739982}" destId="{9903AFBA-5A13-4349-A39D-854233A67AAB}" srcOrd="0" destOrd="0" presId="urn:microsoft.com/office/officeart/2005/8/layout/hierarchy6"/>
-    <dgm:cxn modelId="{BC126B93-5A85-4FE0-92DC-6B5FDE551C7F}" srcId="{35DCDA67-F2A2-441C-AE5D-C1B198AC0662}" destId="{001622B8-067A-4ACE-8911-1AA26B934B71}" srcOrd="0" destOrd="0" parTransId="{7B337E52-DD2F-44E8-9ED5-365B87D9FED1}" sibTransId="{9859AD3B-0077-415C-B213-4209EF6A42CC}"/>
-    <dgm:cxn modelId="{71356C93-D667-40C4-8483-AF68B2C6EF2C}" type="presOf" srcId="{84C7FE82-CB25-4ECD-9CE0-264765FA62D1}" destId="{D2FA8DCC-89A3-4CB1-9FF9-7F8B664B0AF9}" srcOrd="0" destOrd="0" presId="urn:microsoft.com/office/officeart/2005/8/layout/hierarchy6"/>
+    <dgm:cxn modelId="{BC126B93-5A85-4FE0-92DC-6B5FDE551C7F}" srcId="{35DCDA67-F2A2-441C-AE5D-C1B198AC0662}" destId="{001622B8-067A-4ACE-8911-1AA26B934B71}" srcOrd="1" destOrd="0" parTransId="{7B337E52-DD2F-44E8-9ED5-365B87D9FED1}" sibTransId="{9859AD3B-0077-415C-B213-4209EF6A42CC}"/>
     <dgm:cxn modelId="{B89ED895-76C4-4243-AD33-A43480B6045A}" type="presOf" srcId="{5CA15CE3-8396-42E1-8E7E-BD11A58851E2}" destId="{7C0EA656-1D18-4980-86E2-83309EF67A1B}" srcOrd="0" destOrd="0" presId="urn:microsoft.com/office/officeart/2005/8/layout/hierarchy6"/>
+    <dgm:cxn modelId="{8263A098-8DF1-46D5-AEF4-E7017BFC8CDB}" srcId="{35DCDA67-F2A2-441C-AE5D-C1B198AC0662}" destId="{4F534C62-390B-458F-B480-8C2BD5BC7612}" srcOrd="0" destOrd="0" parTransId="{2365B1BB-E64C-4F44-A1AB-DE852EA80CDF}" sibTransId="{D15F2CA4-E27D-4EFE-B3E5-E2CFC341EE58}"/>
+    <dgm:cxn modelId="{1A79AC9A-2E5E-4A10-8F9B-7EB83AAC7E18}" type="presOf" srcId="{C285AA89-3DDC-4450-9A7F-149023CB6A38}" destId="{DDEF067D-8035-4EE8-B26D-F9EF3FCB2EBB}" srcOrd="0" destOrd="0" presId="urn:microsoft.com/office/officeart/2005/8/layout/hierarchy6"/>
     <dgm:cxn modelId="{B1A9919C-13BA-4186-AD8D-00C8C3C38D38}" type="presOf" srcId="{27B0B7D4-9290-4FFB-8E4F-E55C7EC9F8B5}" destId="{190E5C43-FF52-41EF-BC65-4C3846DF4B2F}" srcOrd="0" destOrd="0" presId="urn:microsoft.com/office/officeart/2005/8/layout/hierarchy6"/>
-    <dgm:cxn modelId="{0B9BE19D-4CD3-4482-A328-A9C60DFAA86E}" type="presOf" srcId="{001622B8-067A-4ACE-8911-1AA26B934B71}" destId="{C24AA9F1-E100-43C5-9B3E-E49BBE5DF731}" srcOrd="0" destOrd="0" presId="urn:microsoft.com/office/officeart/2005/8/layout/hierarchy6"/>
-    <dgm:cxn modelId="{1CC5A6A6-8E7A-460B-AF7B-76CD3C59AD04}" type="presOf" srcId="{E116835A-3D10-450B-9413-E1B97894FFA3}" destId="{03CEC701-59F7-4F6F-A2FB-6D1193C6C0E9}" srcOrd="0" destOrd="0" presId="urn:microsoft.com/office/officeart/2005/8/layout/hierarchy6"/>
+    <dgm:cxn modelId="{B0902B9F-C8B1-4873-90F7-353031155418}" type="presOf" srcId="{1177EB47-D773-481F-8FF3-A903D2FAF107}" destId="{692E1C15-5EDE-45B5-A9AC-7A0D80148EC4}" srcOrd="0" destOrd="0" presId="urn:microsoft.com/office/officeart/2005/8/layout/hierarchy6"/>
+    <dgm:cxn modelId="{CAD3E7A4-5C47-4282-B4C4-11E2615134FD}" type="presOf" srcId="{55C08119-F190-4569-BB1D-4D4C7A2B693E}" destId="{E6F5C1DA-D308-408B-88C1-7DE98E99F690}" srcOrd="0" destOrd="0" presId="urn:microsoft.com/office/officeart/2005/8/layout/hierarchy6"/>
     <dgm:cxn modelId="{8754D5A6-FA6C-4190-A145-9C83C339C99D}" srcId="{5CA15CE3-8396-42E1-8E7E-BD11A58851E2}" destId="{F66CC7BD-674A-437D-8C62-29898B13049D}" srcOrd="0" destOrd="0" parTransId="{27B0B7D4-9290-4FFB-8E4F-E55C7EC9F8B5}" sibTransId="{0AE695F0-1447-4B3E-9061-2D7EB833CB67}"/>
     <dgm:cxn modelId="{B7CD7AA7-9E4D-4071-811E-8EADE279661E}" type="presOf" srcId="{5A9D0339-AA51-434F-8B6C-60F99E3633CF}" destId="{1EE97BA3-462E-4247-9C64-D91A323268AC}" srcOrd="0" destOrd="0" presId="urn:microsoft.com/office/officeart/2005/8/layout/hierarchy6"/>
     <dgm:cxn modelId="{B4B77CA9-AEFB-473A-90B3-CA47B2088A8F}" type="presOf" srcId="{14CBFDCC-3ECF-4077-AAFC-9035D3532054}" destId="{6DFBC8DC-FB04-4552-ACB4-2C723637561B}" srcOrd="0" destOrd="0" presId="urn:microsoft.com/office/officeart/2005/8/layout/hierarchy6"/>
     <dgm:cxn modelId="{5811BAAA-C778-4938-B9A0-254EA33A3D9B}" srcId="{BEEE473B-2EC8-470A-9E28-03E623F722B2}" destId="{E116835A-3D10-450B-9413-E1B97894FFA3}" srcOrd="0" destOrd="0" parTransId="{AEF768B3-89BD-4493-B753-D5C7E3F86037}" sibTransId="{52D43CBC-A4A2-45B3-BE26-8C6C6134A79F}"/>
     <dgm:cxn modelId="{8CF0FBBA-644A-4E57-BE45-70F5BB3F9918}" type="presOf" srcId="{441A3D14-7823-4933-A226-6CEE16869DD4}" destId="{86087C67-4375-477E-84D1-836C1F14C793}" srcOrd="0" destOrd="0" presId="urn:microsoft.com/office/officeart/2005/8/layout/hierarchy6"/>
-    <dgm:cxn modelId="{A3CD0FBD-F887-4322-93F1-9CD5BBF42FE8}" type="presOf" srcId="{C285AA89-3DDC-4450-9A7F-149023CB6A38}" destId="{DDEF067D-8035-4EE8-B26D-F9EF3FCB2EBB}" srcOrd="0" destOrd="0" presId="urn:microsoft.com/office/officeart/2005/8/layout/hierarchy6"/>
     <dgm:cxn modelId="{6B2369BD-6D60-4E4E-8AF5-E80529140884}" type="presOf" srcId="{540823D0-D4AA-438F-B805-D3CA6D4539F8}" destId="{A445E83A-B1D7-4754-AB40-1BD356E2B23A}" srcOrd="0" destOrd="0" presId="urn:microsoft.com/office/officeart/2005/8/layout/hierarchy6"/>
     <dgm:cxn modelId="{5E4A92C4-FC82-499F-8060-EE9E3CB03401}" srcId="{9A3D543D-1E9A-4BE5-BFBC-B65722739982}" destId="{35DCDA67-F2A2-441C-AE5D-C1B198AC0662}" srcOrd="0" destOrd="0" parTransId="{675114A4-4D40-4091-9275-9C8175883DB4}" sibTransId="{D315B3E9-E343-4B13-8EAD-6B260F20DDCE}"/>
+    <dgm:cxn modelId="{D04B00CD-D887-4DBE-BFFF-5C38BBE26D11}" type="presOf" srcId="{E116835A-3D10-450B-9413-E1B97894FFA3}" destId="{03CEC701-59F7-4F6F-A2FB-6D1193C6C0E9}" srcOrd="0" destOrd="0" presId="urn:microsoft.com/office/officeart/2005/8/layout/hierarchy6"/>
     <dgm:cxn modelId="{5358C9CD-4C9F-4E16-B72C-FFBB6D6C75B6}" type="presOf" srcId="{1C5F8750-0E8D-4A4F-A5C4-6A02757B2CEE}" destId="{C647C14C-60E2-48E5-85A4-92CF88C6F009}" srcOrd="0" destOrd="0" presId="urn:microsoft.com/office/officeart/2005/8/layout/hierarchy6"/>
-    <dgm:cxn modelId="{41AF80D2-A960-4DBA-8039-3A84182C1BEA}" type="presOf" srcId="{CA09B458-A59A-42E9-823E-CEA240B29164}" destId="{D15C5AB9-F1E9-4D5E-85C9-5C93CA672A4C}" srcOrd="0" destOrd="0" presId="urn:microsoft.com/office/officeart/2005/8/layout/hierarchy6"/>
-    <dgm:cxn modelId="{A15E1ADA-0F17-41F5-9587-6AAA01B0B38D}" type="presOf" srcId="{DEBFFABF-82B9-4D25-8AD5-D3D639130002}" destId="{C506A8BA-439E-4716-BD26-721A6F281A37}" srcOrd="0" destOrd="0" presId="urn:microsoft.com/office/officeart/2005/8/layout/hierarchy6"/>
+    <dgm:cxn modelId="{C139C6D8-22E1-4646-B343-D13545CE04EB}" type="presOf" srcId="{7B337E52-DD2F-44E8-9ED5-365B87D9FED1}" destId="{53BE28EF-99A8-45D2-A439-B1144FBC3954}" srcOrd="0" destOrd="0" presId="urn:microsoft.com/office/officeart/2005/8/layout/hierarchy6"/>
+    <dgm:cxn modelId="{B9F652DE-91EA-4D63-8D87-7F82D3C8F2C4}" type="presOf" srcId="{84C7FE82-CB25-4ECD-9CE0-264765FA62D1}" destId="{D2FA8DCC-89A3-4CB1-9FF9-7F8B664B0AF9}" srcOrd="0" destOrd="0" presId="urn:microsoft.com/office/officeart/2005/8/layout/hierarchy6"/>
     <dgm:cxn modelId="{B46D3CE0-F310-4853-A6BC-5D6AC56C6FB4}" srcId="{540823D0-D4AA-438F-B805-D3CA6D4539F8}" destId="{3FA3C445-9E1D-45B1-AB41-19681A34813A}" srcOrd="0" destOrd="0" parTransId="{33AA2D47-1000-479B-B8DD-8B7CFD50AA2C}" sibTransId="{0FE465D2-8965-47BE-9A7C-4C8466AA2C0E}"/>
     <dgm:cxn modelId="{A270B2EB-18BD-4B40-BD8B-9EEC62090524}" srcId="{53BD6231-3DFE-431F-8D0C-C2EE5F431215}" destId="{CFE7097C-8D2B-4D79-A5D5-84D08B065AD4}" srcOrd="0" destOrd="0" parTransId="{84C7FE82-CB25-4ECD-9CE0-264765FA62D1}" sibTransId="{92CA62EB-398C-4FDA-BBA7-96649940D1E8}"/>
     <dgm:cxn modelId="{0F581FEE-607D-4847-B816-C0141EF64EED}" srcId="{5A9D0339-AA51-434F-8B6C-60F99E3633CF}" destId="{540823D0-D4AA-438F-B805-D3CA6D4539F8}" srcOrd="1" destOrd="0" parTransId="{441A3D14-7823-4933-A226-6CEE16869DD4}" sibTransId="{2DF52586-D00E-4C55-8704-4E1840133706}"/>
+    <dgm:cxn modelId="{6017B1F2-1A41-447D-946B-7419A2D30BA8}" type="presOf" srcId="{DEBFFABF-82B9-4D25-8AD5-D3D639130002}" destId="{C506A8BA-439E-4716-BD26-721A6F281A37}" srcOrd="0" destOrd="0" presId="urn:microsoft.com/office/officeart/2005/8/layout/hierarchy6"/>
+    <dgm:cxn modelId="{953982F7-0669-42F2-9316-F64619F9B050}" type="presOf" srcId="{BEEE473B-2EC8-470A-9E28-03E623F722B2}" destId="{1F02E85D-CEC4-408D-AADB-4E14B7734CE4}" srcOrd="0" destOrd="0" presId="urn:microsoft.com/office/officeart/2005/8/layout/hierarchy6"/>
+    <dgm:cxn modelId="{3605DEF7-0454-4F7B-A194-54860FB52F86}" type="presOf" srcId="{53BD6231-3DFE-431F-8D0C-C2EE5F431215}" destId="{EA7FACE5-B0A2-41B9-9E88-2A0B6E6837A7}" srcOrd="0" destOrd="0" presId="urn:microsoft.com/office/officeart/2005/8/layout/hierarchy6"/>
     <dgm:cxn modelId="{1364C3FD-45A2-4958-97EB-1C236E0FAF2D}" srcId="{001622B8-067A-4ACE-8911-1AA26B934B71}" destId="{53BD6231-3DFE-431F-8D0C-C2EE5F431215}" srcOrd="0" destOrd="0" parTransId="{55C08119-F190-4569-BB1D-4D4C7A2B693E}" sibTransId="{32B5B4DC-331B-4BF3-8A4C-BCB2317F24A4}"/>
     <dgm:cxn modelId="{3902E448-AB3D-45EB-B94D-11209D0F1EC8}" type="presParOf" srcId="{C647C14C-60E2-48E5-85A4-92CF88C6F009}" destId="{7FBC73CD-6899-48F0-97D2-0FAF099D00D7}" srcOrd="0" destOrd="0" presId="urn:microsoft.com/office/officeart/2005/8/layout/hierarchy6"/>
     <dgm:cxn modelId="{11592FFD-A907-454A-9353-C7F64E209C55}" type="presParOf" srcId="{7FBC73CD-6899-48F0-97D2-0FAF099D00D7}" destId="{345ABD8D-1ABA-4A43-A568-C10F9BC71744}" srcOrd="0" destOrd="0" presId="urn:microsoft.com/office/officeart/2005/8/layout/hierarchy6"/>
@@ -3667,30 +3764,38 @@
     <dgm:cxn modelId="{8BB767B0-6A09-4499-A930-4E00FD8CEFEE}" type="presParOf" srcId="{DCCD5EFE-7876-4BE0-8B52-0B8CAA5B5D98}" destId="{CF8D64B8-D61F-466F-8ABA-43D7D9B04C06}" srcOrd="1" destOrd="0" presId="urn:microsoft.com/office/officeart/2005/8/layout/hierarchy6"/>
     <dgm:cxn modelId="{82B43CFA-A9DB-44AC-9927-B7260249ABD7}" type="presParOf" srcId="{CF8D64B8-D61F-466F-8ABA-43D7D9B04C06}" destId="{0ECD015A-E51F-4E92-93F8-42CA82FE8288}" srcOrd="0" destOrd="0" presId="urn:microsoft.com/office/officeart/2005/8/layout/hierarchy6"/>
     <dgm:cxn modelId="{6E917304-E215-4C62-86A7-18A940FE52D1}" type="presParOf" srcId="{CF8D64B8-D61F-466F-8ABA-43D7D9B04C06}" destId="{26362DDC-DD1A-4BB8-AE23-6E6A6745B19C}" srcOrd="1" destOrd="0" presId="urn:microsoft.com/office/officeart/2005/8/layout/hierarchy6"/>
-    <dgm:cxn modelId="{0439A9AA-9240-4459-A9B6-D1A2EBDB2E0F}" type="presParOf" srcId="{26362DDC-DD1A-4BB8-AE23-6E6A6745B19C}" destId="{53BE28EF-99A8-45D2-A439-B1144FBC3954}" srcOrd="0" destOrd="0" presId="urn:microsoft.com/office/officeart/2005/8/layout/hierarchy6"/>
-    <dgm:cxn modelId="{F8925640-3197-400C-9CBA-F87B042F7652}" type="presParOf" srcId="{26362DDC-DD1A-4BB8-AE23-6E6A6745B19C}" destId="{D3FD43ED-49D9-4CB5-A2F0-DFC7987DD202}" srcOrd="1" destOrd="0" presId="urn:microsoft.com/office/officeart/2005/8/layout/hierarchy6"/>
-    <dgm:cxn modelId="{C984A278-866D-44B4-8D64-85F866987A6F}" type="presParOf" srcId="{D3FD43ED-49D9-4CB5-A2F0-DFC7987DD202}" destId="{C24AA9F1-E100-43C5-9B3E-E49BBE5DF731}" srcOrd="0" destOrd="0" presId="urn:microsoft.com/office/officeart/2005/8/layout/hierarchy6"/>
-    <dgm:cxn modelId="{ABB19E21-5C1E-4175-B538-C8486E3BF7B9}" type="presParOf" srcId="{D3FD43ED-49D9-4CB5-A2F0-DFC7987DD202}" destId="{85A47341-493F-4C78-B925-6D17CBFED368}" srcOrd="1" destOrd="0" presId="urn:microsoft.com/office/officeart/2005/8/layout/hierarchy6"/>
-    <dgm:cxn modelId="{AE8CABED-AF5E-46D9-BBFF-D8E79DD070B5}" type="presParOf" srcId="{85A47341-493F-4C78-B925-6D17CBFED368}" destId="{E6F5C1DA-D308-408B-88C1-7DE98E99F690}" srcOrd="0" destOrd="0" presId="urn:microsoft.com/office/officeart/2005/8/layout/hierarchy6"/>
-    <dgm:cxn modelId="{275DF185-C525-4072-AA3E-15FBC62F64D6}" type="presParOf" srcId="{85A47341-493F-4C78-B925-6D17CBFED368}" destId="{8F5D01B4-3E5A-4BD4-B68D-CC352A4E8257}" srcOrd="1" destOrd="0" presId="urn:microsoft.com/office/officeart/2005/8/layout/hierarchy6"/>
-    <dgm:cxn modelId="{BEB2DB13-8F19-4220-A029-2AF853F2FCCD}" type="presParOf" srcId="{8F5D01B4-3E5A-4BD4-B68D-CC352A4E8257}" destId="{EA7FACE5-B0A2-41B9-9E88-2A0B6E6837A7}" srcOrd="0" destOrd="0" presId="urn:microsoft.com/office/officeart/2005/8/layout/hierarchy6"/>
-    <dgm:cxn modelId="{9096CAFF-8765-418D-BA11-547994F72705}" type="presParOf" srcId="{8F5D01B4-3E5A-4BD4-B68D-CC352A4E8257}" destId="{82E4EAC8-6C7E-4BD1-AF27-FEF63E238D7B}" srcOrd="1" destOrd="0" presId="urn:microsoft.com/office/officeart/2005/8/layout/hierarchy6"/>
-    <dgm:cxn modelId="{16438145-D925-4D79-8219-B8CB25853855}" type="presParOf" srcId="{82E4EAC8-6C7E-4BD1-AF27-FEF63E238D7B}" destId="{D2FA8DCC-89A3-4CB1-9FF9-7F8B664B0AF9}" srcOrd="0" destOrd="0" presId="urn:microsoft.com/office/officeart/2005/8/layout/hierarchy6"/>
-    <dgm:cxn modelId="{4CD8CE3F-0C4B-4B6A-BE93-8A3D2003EF55}" type="presParOf" srcId="{82E4EAC8-6C7E-4BD1-AF27-FEF63E238D7B}" destId="{2B314F4B-35F2-4267-A97E-CAD08F585A27}" srcOrd="1" destOrd="0" presId="urn:microsoft.com/office/officeart/2005/8/layout/hierarchy6"/>
-    <dgm:cxn modelId="{FC29D4D3-E00A-4875-8C1D-622495C104EB}" type="presParOf" srcId="{2B314F4B-35F2-4267-A97E-CAD08F585A27}" destId="{693E7B0F-4C3D-48FF-A291-A297AD09F19A}" srcOrd="0" destOrd="0" presId="urn:microsoft.com/office/officeart/2005/8/layout/hierarchy6"/>
-    <dgm:cxn modelId="{24C0CF3F-A2E1-4B3D-8C81-D427B034F0EC}" type="presParOf" srcId="{2B314F4B-35F2-4267-A97E-CAD08F585A27}" destId="{24E3E993-3795-4816-83E6-9D2D429CDF86}" srcOrd="1" destOrd="0" presId="urn:microsoft.com/office/officeart/2005/8/layout/hierarchy6"/>
-    <dgm:cxn modelId="{09606EDE-1E30-4934-8149-B171C098CF44}" type="presParOf" srcId="{26362DDC-DD1A-4BB8-AE23-6E6A6745B19C}" destId="{DDEF067D-8035-4EE8-B26D-F9EF3FCB2EBB}" srcOrd="2" destOrd="0" presId="urn:microsoft.com/office/officeart/2005/8/layout/hierarchy6"/>
-    <dgm:cxn modelId="{1461CD67-C466-43B2-A191-331DB9908B56}" type="presParOf" srcId="{26362DDC-DD1A-4BB8-AE23-6E6A6745B19C}" destId="{5C701B20-89F4-4F50-9BD5-3E008C6D7DE6}" srcOrd="3" destOrd="0" presId="urn:microsoft.com/office/officeart/2005/8/layout/hierarchy6"/>
-    <dgm:cxn modelId="{2E1B8D0B-C360-4CCB-A244-679BA45047F7}" type="presParOf" srcId="{5C701B20-89F4-4F50-9BD5-3E008C6D7DE6}" destId="{C506A8BA-439E-4716-BD26-721A6F281A37}" srcOrd="0" destOrd="0" presId="urn:microsoft.com/office/officeart/2005/8/layout/hierarchy6"/>
-    <dgm:cxn modelId="{86A67DED-D2BB-464C-AC2B-DB97D7CB8317}" type="presParOf" srcId="{5C701B20-89F4-4F50-9BD5-3E008C6D7DE6}" destId="{0D14266D-155E-47D2-BD04-D1ADB411484B}" srcOrd="1" destOrd="0" presId="urn:microsoft.com/office/officeart/2005/8/layout/hierarchy6"/>
-    <dgm:cxn modelId="{0A13449E-0A44-4FB3-9D73-C4D39F328B7E}" type="presParOf" srcId="{0D14266D-155E-47D2-BD04-D1ADB411484B}" destId="{D15C5AB9-F1E9-4D5E-85C9-5C93CA672A4C}" srcOrd="0" destOrd="0" presId="urn:microsoft.com/office/officeart/2005/8/layout/hierarchy6"/>
-    <dgm:cxn modelId="{17A2E7E4-49CA-45A7-877A-5100F4B30349}" type="presParOf" srcId="{0D14266D-155E-47D2-BD04-D1ADB411484B}" destId="{E8E838FA-19ED-40BF-9663-79F2E95A96F0}" srcOrd="1" destOrd="0" presId="urn:microsoft.com/office/officeart/2005/8/layout/hierarchy6"/>
-    <dgm:cxn modelId="{D09E5E34-5337-4079-AE16-1D81C76E1C07}" type="presParOf" srcId="{E8E838FA-19ED-40BF-9663-79F2E95A96F0}" destId="{1F02E85D-CEC4-408D-AADB-4E14B7734CE4}" srcOrd="0" destOrd="0" presId="urn:microsoft.com/office/officeart/2005/8/layout/hierarchy6"/>
-    <dgm:cxn modelId="{FD11DDDE-AE62-4D4E-90B8-B5B7F5F471EF}" type="presParOf" srcId="{E8E838FA-19ED-40BF-9663-79F2E95A96F0}" destId="{0DDA1025-F861-46DE-9999-4C9FF60F2BA1}" srcOrd="1" destOrd="0" presId="urn:microsoft.com/office/officeart/2005/8/layout/hierarchy6"/>
-    <dgm:cxn modelId="{4ADCC184-D0B3-4002-9DFC-83BBA7456455}" type="presParOf" srcId="{0DDA1025-F861-46DE-9999-4C9FF60F2BA1}" destId="{2B44D44D-9C15-4BE4-8857-6902DD216E02}" srcOrd="0" destOrd="0" presId="urn:microsoft.com/office/officeart/2005/8/layout/hierarchy6"/>
-    <dgm:cxn modelId="{E745F990-BA7A-4BC9-8A58-EFC60EDF67B7}" type="presParOf" srcId="{0DDA1025-F861-46DE-9999-4C9FF60F2BA1}" destId="{52E0AE4D-5240-4116-8871-F00A2F071C25}" srcOrd="1" destOrd="0" presId="urn:microsoft.com/office/officeart/2005/8/layout/hierarchy6"/>
-    <dgm:cxn modelId="{03AEEAB2-50A0-4E05-9B25-7FA0521EBD80}" type="presParOf" srcId="{52E0AE4D-5240-4116-8871-F00A2F071C25}" destId="{03CEC701-59F7-4F6F-A2FB-6D1193C6C0E9}" srcOrd="0" destOrd="0" presId="urn:microsoft.com/office/officeart/2005/8/layout/hierarchy6"/>
-    <dgm:cxn modelId="{2FB391A1-BF1A-4FE7-9853-D253D45DB6A7}" type="presParOf" srcId="{52E0AE4D-5240-4116-8871-F00A2F071C25}" destId="{70C641D7-008F-491D-A8A1-389516750A5F}" srcOrd="1" destOrd="0" presId="urn:microsoft.com/office/officeart/2005/8/layout/hierarchy6"/>
+    <dgm:cxn modelId="{048C80AE-7F63-456A-80EF-00193FD223B3}" type="presParOf" srcId="{26362DDC-DD1A-4BB8-AE23-6E6A6745B19C}" destId="{6BED99B3-E35D-4479-BD8F-C89911CBA7D9}" srcOrd="0" destOrd="0" presId="urn:microsoft.com/office/officeart/2005/8/layout/hierarchy6"/>
+    <dgm:cxn modelId="{DB35C91B-BE5B-4B69-AB39-74BF0AA8DC02}" type="presParOf" srcId="{26362DDC-DD1A-4BB8-AE23-6E6A6745B19C}" destId="{37DA590A-EC83-4F01-B5EE-14F5DB4C53FE}" srcOrd="1" destOrd="0" presId="urn:microsoft.com/office/officeart/2005/8/layout/hierarchy6"/>
+    <dgm:cxn modelId="{96900D70-D0B4-4E73-A50D-42F928E32990}" type="presParOf" srcId="{37DA590A-EC83-4F01-B5EE-14F5DB4C53FE}" destId="{ABF86001-E192-4808-9A98-9489CE78A520}" srcOrd="0" destOrd="0" presId="urn:microsoft.com/office/officeart/2005/8/layout/hierarchy6"/>
+    <dgm:cxn modelId="{BAF06293-1E72-4F38-8BFF-AE257287F66B}" type="presParOf" srcId="{37DA590A-EC83-4F01-B5EE-14F5DB4C53FE}" destId="{A57B7B44-3E4C-4B57-8449-BFA97DBBEAD8}" srcOrd="1" destOrd="0" presId="urn:microsoft.com/office/officeart/2005/8/layout/hierarchy6"/>
+    <dgm:cxn modelId="{80AC2B3E-2F82-4CD3-8924-B3269D5A3374}" type="presParOf" srcId="{A57B7B44-3E4C-4B57-8449-BFA97DBBEAD8}" destId="{FBB1584B-E4A3-46AD-B9FF-73233513DEC5}" srcOrd="0" destOrd="0" presId="urn:microsoft.com/office/officeart/2005/8/layout/hierarchy6"/>
+    <dgm:cxn modelId="{2821E519-6A0E-484B-B800-32E21EB5E095}" type="presParOf" srcId="{A57B7B44-3E4C-4B57-8449-BFA97DBBEAD8}" destId="{A54E2C43-0C62-4198-8BEA-4CA1935FF591}" srcOrd="1" destOrd="0" presId="urn:microsoft.com/office/officeart/2005/8/layout/hierarchy6"/>
+    <dgm:cxn modelId="{583E96A6-4771-4AE2-B768-AE10D8606B32}" type="presParOf" srcId="{A54E2C43-0C62-4198-8BEA-4CA1935FF591}" destId="{692E1C15-5EDE-45B5-A9AC-7A0D80148EC4}" srcOrd="0" destOrd="0" presId="urn:microsoft.com/office/officeart/2005/8/layout/hierarchy6"/>
+    <dgm:cxn modelId="{4D344168-D95A-41BA-880F-C6F91A90F906}" type="presParOf" srcId="{A54E2C43-0C62-4198-8BEA-4CA1935FF591}" destId="{5EAD126F-0496-4AAF-82E4-5CF5CF0D0EDA}" srcOrd="1" destOrd="0" presId="urn:microsoft.com/office/officeart/2005/8/layout/hierarchy6"/>
+    <dgm:cxn modelId="{2170D084-A016-46CF-9117-8F5EA379E5F7}" type="presParOf" srcId="{26362DDC-DD1A-4BB8-AE23-6E6A6745B19C}" destId="{53BE28EF-99A8-45D2-A439-B1144FBC3954}" srcOrd="2" destOrd="0" presId="urn:microsoft.com/office/officeart/2005/8/layout/hierarchy6"/>
+    <dgm:cxn modelId="{121FB79C-F967-458D-9DD2-D98D3992EBA8}" type="presParOf" srcId="{26362DDC-DD1A-4BB8-AE23-6E6A6745B19C}" destId="{D3FD43ED-49D9-4CB5-A2F0-DFC7987DD202}" srcOrd="3" destOrd="0" presId="urn:microsoft.com/office/officeart/2005/8/layout/hierarchy6"/>
+    <dgm:cxn modelId="{6EC57608-2270-40CA-989D-5A1A83915AD7}" type="presParOf" srcId="{D3FD43ED-49D9-4CB5-A2F0-DFC7987DD202}" destId="{C24AA9F1-E100-43C5-9B3E-E49BBE5DF731}" srcOrd="0" destOrd="0" presId="urn:microsoft.com/office/officeart/2005/8/layout/hierarchy6"/>
+    <dgm:cxn modelId="{F5D3CA1D-C553-428B-9423-67CBA412D621}" type="presParOf" srcId="{D3FD43ED-49D9-4CB5-A2F0-DFC7987DD202}" destId="{85A47341-493F-4C78-B925-6D17CBFED368}" srcOrd="1" destOrd="0" presId="urn:microsoft.com/office/officeart/2005/8/layout/hierarchy6"/>
+    <dgm:cxn modelId="{0763770C-D601-4103-8BB0-57AF7365C688}" type="presParOf" srcId="{85A47341-493F-4C78-B925-6D17CBFED368}" destId="{E6F5C1DA-D308-408B-88C1-7DE98E99F690}" srcOrd="0" destOrd="0" presId="urn:microsoft.com/office/officeart/2005/8/layout/hierarchy6"/>
+    <dgm:cxn modelId="{1C2F2B84-45E1-4D0C-AA3B-7F9554EB0B75}" type="presParOf" srcId="{85A47341-493F-4C78-B925-6D17CBFED368}" destId="{8F5D01B4-3E5A-4BD4-B68D-CC352A4E8257}" srcOrd="1" destOrd="0" presId="urn:microsoft.com/office/officeart/2005/8/layout/hierarchy6"/>
+    <dgm:cxn modelId="{985F10EB-25E3-4056-B114-66DE1A909632}" type="presParOf" srcId="{8F5D01B4-3E5A-4BD4-B68D-CC352A4E8257}" destId="{EA7FACE5-B0A2-41B9-9E88-2A0B6E6837A7}" srcOrd="0" destOrd="0" presId="urn:microsoft.com/office/officeart/2005/8/layout/hierarchy6"/>
+    <dgm:cxn modelId="{1BDD5712-3AAD-430B-8DDF-5AB9E190B2AF}" type="presParOf" srcId="{8F5D01B4-3E5A-4BD4-B68D-CC352A4E8257}" destId="{82E4EAC8-6C7E-4BD1-AF27-FEF63E238D7B}" srcOrd="1" destOrd="0" presId="urn:microsoft.com/office/officeart/2005/8/layout/hierarchy6"/>
+    <dgm:cxn modelId="{0FA54F9A-7D22-4FA5-9CE6-E1007529ACC9}" type="presParOf" srcId="{82E4EAC8-6C7E-4BD1-AF27-FEF63E238D7B}" destId="{D2FA8DCC-89A3-4CB1-9FF9-7F8B664B0AF9}" srcOrd="0" destOrd="0" presId="urn:microsoft.com/office/officeart/2005/8/layout/hierarchy6"/>
+    <dgm:cxn modelId="{A0216B2A-6907-4BB6-BC77-5CE3B6BF72F6}" type="presParOf" srcId="{82E4EAC8-6C7E-4BD1-AF27-FEF63E238D7B}" destId="{2B314F4B-35F2-4267-A97E-CAD08F585A27}" srcOrd="1" destOrd="0" presId="urn:microsoft.com/office/officeart/2005/8/layout/hierarchy6"/>
+    <dgm:cxn modelId="{1D8C6784-F197-41A1-BF2F-4F344EA27BB2}" type="presParOf" srcId="{2B314F4B-35F2-4267-A97E-CAD08F585A27}" destId="{693E7B0F-4C3D-48FF-A291-A297AD09F19A}" srcOrd="0" destOrd="0" presId="urn:microsoft.com/office/officeart/2005/8/layout/hierarchy6"/>
+    <dgm:cxn modelId="{42505959-6F34-43DD-8FA6-71362AE3486D}" type="presParOf" srcId="{2B314F4B-35F2-4267-A97E-CAD08F585A27}" destId="{24E3E993-3795-4816-83E6-9D2D429CDF86}" srcOrd="1" destOrd="0" presId="urn:microsoft.com/office/officeart/2005/8/layout/hierarchy6"/>
+    <dgm:cxn modelId="{21422CEB-DF9D-4AA4-897D-3DDF3E9EB0E0}" type="presParOf" srcId="{26362DDC-DD1A-4BB8-AE23-6E6A6745B19C}" destId="{DDEF067D-8035-4EE8-B26D-F9EF3FCB2EBB}" srcOrd="4" destOrd="0" presId="urn:microsoft.com/office/officeart/2005/8/layout/hierarchy6"/>
+    <dgm:cxn modelId="{29FFEA81-C0DB-4DAB-BF72-A30A7680D16B}" type="presParOf" srcId="{26362DDC-DD1A-4BB8-AE23-6E6A6745B19C}" destId="{5C701B20-89F4-4F50-9BD5-3E008C6D7DE6}" srcOrd="5" destOrd="0" presId="urn:microsoft.com/office/officeart/2005/8/layout/hierarchy6"/>
+    <dgm:cxn modelId="{12E7BBA9-3832-4066-BB2A-B7870E5F6400}" type="presParOf" srcId="{5C701B20-89F4-4F50-9BD5-3E008C6D7DE6}" destId="{C506A8BA-439E-4716-BD26-721A6F281A37}" srcOrd="0" destOrd="0" presId="urn:microsoft.com/office/officeart/2005/8/layout/hierarchy6"/>
+    <dgm:cxn modelId="{56583343-1BD3-45F4-A499-AC6727E06FC5}" type="presParOf" srcId="{5C701B20-89F4-4F50-9BD5-3E008C6D7DE6}" destId="{0D14266D-155E-47D2-BD04-D1ADB411484B}" srcOrd="1" destOrd="0" presId="urn:microsoft.com/office/officeart/2005/8/layout/hierarchy6"/>
+    <dgm:cxn modelId="{ACEF95C2-9488-4E7A-9F26-5DC86F7BDD26}" type="presParOf" srcId="{0D14266D-155E-47D2-BD04-D1ADB411484B}" destId="{D15C5AB9-F1E9-4D5E-85C9-5C93CA672A4C}" srcOrd="0" destOrd="0" presId="urn:microsoft.com/office/officeart/2005/8/layout/hierarchy6"/>
+    <dgm:cxn modelId="{34D746D1-4A0B-4F8D-9E69-C19C0396B69C}" type="presParOf" srcId="{0D14266D-155E-47D2-BD04-D1ADB411484B}" destId="{E8E838FA-19ED-40BF-9663-79F2E95A96F0}" srcOrd="1" destOrd="0" presId="urn:microsoft.com/office/officeart/2005/8/layout/hierarchy6"/>
+    <dgm:cxn modelId="{3FAFD0F2-9B13-4331-ADDB-557CD2F311FA}" type="presParOf" srcId="{E8E838FA-19ED-40BF-9663-79F2E95A96F0}" destId="{1F02E85D-CEC4-408D-AADB-4E14B7734CE4}" srcOrd="0" destOrd="0" presId="urn:microsoft.com/office/officeart/2005/8/layout/hierarchy6"/>
+    <dgm:cxn modelId="{2257364A-AB0E-467C-8C2A-76B51892382C}" type="presParOf" srcId="{E8E838FA-19ED-40BF-9663-79F2E95A96F0}" destId="{0DDA1025-F861-46DE-9999-4C9FF60F2BA1}" srcOrd="1" destOrd="0" presId="urn:microsoft.com/office/officeart/2005/8/layout/hierarchy6"/>
+    <dgm:cxn modelId="{B0824BCF-B81D-43BB-A699-2E09D140242A}" type="presParOf" srcId="{0DDA1025-F861-46DE-9999-4C9FF60F2BA1}" destId="{2B44D44D-9C15-4BE4-8857-6902DD216E02}" srcOrd="0" destOrd="0" presId="urn:microsoft.com/office/officeart/2005/8/layout/hierarchy6"/>
+    <dgm:cxn modelId="{7DC290B7-8188-498F-A744-24A7FAABEBE2}" type="presParOf" srcId="{0DDA1025-F861-46DE-9999-4C9FF60F2BA1}" destId="{52E0AE4D-5240-4116-8871-F00A2F071C25}" srcOrd="1" destOrd="0" presId="urn:microsoft.com/office/officeart/2005/8/layout/hierarchy6"/>
+    <dgm:cxn modelId="{6DBA4847-8568-482C-ADDE-6AC87A30A22E}" type="presParOf" srcId="{52E0AE4D-5240-4116-8871-F00A2F071C25}" destId="{03CEC701-59F7-4F6F-A2FB-6D1193C6C0E9}" srcOrd="0" destOrd="0" presId="urn:microsoft.com/office/officeart/2005/8/layout/hierarchy6"/>
+    <dgm:cxn modelId="{814B7019-B513-4F96-A725-3491E330E938}" type="presParOf" srcId="{52E0AE4D-5240-4116-8871-F00A2F071C25}" destId="{70C641D7-008F-491D-A8A1-389516750A5F}" srcOrd="1" destOrd="0" presId="urn:microsoft.com/office/officeart/2005/8/layout/hierarchy6"/>
     <dgm:cxn modelId="{CB79AEE9-6809-42EA-9AD5-6E70DE0E6FD0}" type="presParOf" srcId="{DCCD5EFE-7876-4BE0-8B52-0B8CAA5B5D98}" destId="{6D500FE4-6E88-4115-B204-2A401C1E43A0}" srcOrd="2" destOrd="0" presId="urn:microsoft.com/office/officeart/2005/8/layout/hierarchy6"/>
     <dgm:cxn modelId="{7D3F0295-D9D6-4634-869C-4356D71EFEC4}" type="presParOf" srcId="{DCCD5EFE-7876-4BE0-8B52-0B8CAA5B5D98}" destId="{68735FE1-5986-4989-BCFA-E7980B972273}" srcOrd="3" destOrd="0" presId="urn:microsoft.com/office/officeart/2005/8/layout/hierarchy6"/>
     <dgm:cxn modelId="{BCD9E5E9-7130-4803-BED4-F5394D7BA591}" type="presParOf" srcId="{68735FE1-5986-4989-BCFA-E7980B972273}" destId="{1EE97BA3-462E-4247-9C64-D91A323268AC}" srcOrd="0" destOrd="0" presId="urn:microsoft.com/office/officeart/2005/8/layout/hierarchy6"/>
@@ -4218,8 +4323,8 @@
       </dsp:nvSpPr>
       <dsp:spPr>
         <a:xfrm>
-          <a:off x="4847025" y="3221"/>
-          <a:ext cx="1413653" cy="942435"/>
+          <a:off x="5316649" y="182413"/>
+          <a:ext cx="1332202" cy="888135"/>
         </a:xfrm>
         <a:prstGeom prst="roundRect">
           <a:avLst>
@@ -4285,8 +4390,8 @@
         </a:p>
       </dsp:txBody>
       <dsp:txXfrm>
-        <a:off x="4874628" y="30824"/>
-        <a:ext cx="1358447" cy="887229"/>
+        <a:off x="5342662" y="208426"/>
+        <a:ext cx="1280176" cy="836109"/>
       </dsp:txXfrm>
     </dsp:sp>
     <dsp:sp modelId="{41AB122B-081A-4865-AD38-E3670CB221C3}">
@@ -4296,8 +4401,8 @@
       </dsp:nvSpPr>
       <dsp:spPr>
         <a:xfrm>
-          <a:off x="3645512" y="945657"/>
-          <a:ext cx="1908340" cy="376974"/>
+          <a:off x="3751398" y="1070548"/>
+          <a:ext cx="2231352" cy="355254"/>
         </a:xfrm>
         <a:custGeom>
           <a:avLst/>
@@ -4308,16 +4413,16 @@
           <a:pathLst>
             <a:path>
               <a:moveTo>
-                <a:pt x="1908340" y="0"/>
+                <a:pt x="2231352" y="0"/>
               </a:moveTo>
               <a:lnTo>
-                <a:pt x="1908340" y="188487"/>
+                <a:pt x="2231352" y="177627"/>
               </a:lnTo>
               <a:lnTo>
-                <a:pt x="0" y="188487"/>
+                <a:pt x="0" y="177627"/>
               </a:lnTo>
               <a:lnTo>
-                <a:pt x="0" y="376974"/>
+                <a:pt x="0" y="355254"/>
               </a:lnTo>
             </a:path>
           </a:pathLst>
@@ -4357,8 +4462,8 @@
       </dsp:nvSpPr>
       <dsp:spPr>
         <a:xfrm>
-          <a:off x="2938685" y="1322631"/>
-          <a:ext cx="1413653" cy="942435"/>
+          <a:off x="3085296" y="1425802"/>
+          <a:ext cx="1332202" cy="888135"/>
         </a:xfrm>
         <a:prstGeom prst="roundRect">
           <a:avLst>
@@ -4442,19 +4547,19 @@
         </a:p>
       </dsp:txBody>
       <dsp:txXfrm>
-        <a:off x="2966288" y="1350234"/>
-        <a:ext cx="1358447" cy="887229"/>
+        <a:off x="3111309" y="1451815"/>
+        <a:ext cx="1280176" cy="836109"/>
       </dsp:txXfrm>
     </dsp:sp>
-    <dsp:sp modelId="{53BE28EF-99A8-45D2-A439-B1144FBC3954}">
+    <dsp:sp modelId="{6BED99B3-E35D-4479-BD8F-C89911CBA7D9}">
       <dsp:nvSpPr>
         <dsp:cNvPr id="0" name=""/>
         <dsp:cNvSpPr/>
       </dsp:nvSpPr>
       <dsp:spPr>
         <a:xfrm>
-          <a:off x="2576125" y="2265066"/>
-          <a:ext cx="1069386" cy="376974"/>
+          <a:off x="1886487" y="2313937"/>
+          <a:ext cx="1864910" cy="355254"/>
         </a:xfrm>
         <a:custGeom>
           <a:avLst/>
@@ -4465,16 +4570,296 @@
           <a:pathLst>
             <a:path>
               <a:moveTo>
-                <a:pt x="1069386" y="0"/>
+                <a:pt x="1864910" y="0"/>
               </a:moveTo>
               <a:lnTo>
-                <a:pt x="1069386" y="188487"/>
+                <a:pt x="1864910" y="177627"/>
               </a:lnTo>
               <a:lnTo>
-                <a:pt x="0" y="188487"/>
+                <a:pt x="0" y="177627"/>
               </a:lnTo>
               <a:lnTo>
-                <a:pt x="0" y="376974"/>
+                <a:pt x="0" y="355254"/>
+              </a:lnTo>
+            </a:path>
+          </a:pathLst>
+        </a:custGeom>
+        <a:noFill/>
+        <a:ln w="34925" cap="flat" cmpd="sng" algn="in">
+          <a:solidFill>
+            <a:schemeClr val="accent3">
+              <a:hueOff val="0"/>
+              <a:satOff val="0"/>
+              <a:lumOff val="0"/>
+              <a:alphaOff val="0"/>
+            </a:schemeClr>
+          </a:solidFill>
+          <a:prstDash val="solid"/>
+        </a:ln>
+        <a:effectLst/>
+        <a:scene3d>
+          <a:camera prst="orthographicFront"/>
+          <a:lightRig rig="chilly" dir="t"/>
+        </a:scene3d>
+        <a:sp3d z="-40000" prstMaterial="matte"/>
+      </dsp:spPr>
+      <dsp:style>
+        <a:lnRef idx="2">
+          <a:scrgbClr r="0" g="0" b="0"/>
+        </a:lnRef>
+        <a:fillRef idx="0">
+          <a:scrgbClr r="0" g="0" b="0"/>
+        </a:fillRef>
+        <a:effectRef idx="0">
+          <a:scrgbClr r="0" g="0" b="0"/>
+        </a:effectRef>
+        <a:fontRef idx="minor"/>
+      </dsp:style>
+    </dsp:sp>
+    <dsp:sp modelId="{ABF86001-E192-4808-9A98-9489CE78A520}">
+      <dsp:nvSpPr>
+        <dsp:cNvPr id="0" name=""/>
+        <dsp:cNvSpPr/>
+      </dsp:nvSpPr>
+      <dsp:spPr>
+        <a:xfrm>
+          <a:off x="1220386" y="2669191"/>
+          <a:ext cx="1332202" cy="888135"/>
+        </a:xfrm>
+        <a:prstGeom prst="roundRect">
+          <a:avLst>
+            <a:gd name="adj" fmla="val 10000"/>
+          </a:avLst>
+        </a:prstGeom>
+        <a:solidFill>
+          <a:schemeClr val="accent3">
+            <a:hueOff val="0"/>
+            <a:satOff val="0"/>
+            <a:lumOff val="0"/>
+            <a:alphaOff val="0"/>
+          </a:schemeClr>
+        </a:solidFill>
+        <a:ln>
+          <a:noFill/>
+        </a:ln>
+        <a:effectLst/>
+        <a:scene3d>
+          <a:camera prst="orthographicFront"/>
+          <a:lightRig rig="chilly" dir="t"/>
+        </a:scene3d>
+        <a:sp3d prstMaterial="translucentPowder">
+          <a:bevelT w="127000" h="25400" prst="softRound"/>
+        </a:sp3d>
+      </dsp:spPr>
+      <dsp:style>
+        <a:lnRef idx="0">
+          <a:scrgbClr r="0" g="0" b="0"/>
+        </a:lnRef>
+        <a:fillRef idx="1">
+          <a:scrgbClr r="0" g="0" b="0"/>
+        </a:fillRef>
+        <a:effectRef idx="0">
+          <a:scrgbClr r="0" g="0" b="0"/>
+        </a:effectRef>
+        <a:fontRef idx="minor">
+          <a:schemeClr val="lt1"/>
+        </a:fontRef>
+      </dsp:style>
+      <dsp:txBody>
+        <a:bodyPr spcFirstLastPara="0" vert="horz" wrap="square" lIns="57150" tIns="57150" rIns="57150" bIns="57150" numCol="1" spcCol="1270" anchor="ctr" anchorCtr="0">
+          <a:noAutofit/>
+        </a:bodyPr>
+        <a:lstStyle/>
+        <a:p>
+          <a:pPr marL="0" lvl="0" indent="0" algn="ctr" defTabSz="666750">
+            <a:lnSpc>
+              <a:spcPct val="90000"/>
+            </a:lnSpc>
+            <a:spcBef>
+              <a:spcPct val="0"/>
+            </a:spcBef>
+            <a:spcAft>
+              <a:spcPct val="35000"/>
+            </a:spcAft>
+            <a:buNone/>
+          </a:pPr>
+          <a:r>
+            <a:rPr lang="es-AR" sz="1500" kern="1200" dirty="0"/>
+            <a:t>TIMER</a:t>
+          </a:r>
+        </a:p>
+      </dsp:txBody>
+      <dsp:txXfrm>
+        <a:off x="1246399" y="2695204"/>
+        <a:ext cx="1280176" cy="836109"/>
+      </dsp:txXfrm>
+    </dsp:sp>
+    <dsp:sp modelId="{FBB1584B-E4A3-46AD-B9FF-73233513DEC5}">
+      <dsp:nvSpPr>
+        <dsp:cNvPr id="0" name=""/>
+        <dsp:cNvSpPr/>
+      </dsp:nvSpPr>
+      <dsp:spPr>
+        <a:xfrm>
+          <a:off x="1840767" y="3557326"/>
+          <a:ext cx="91440" cy="355254"/>
+        </a:xfrm>
+        <a:custGeom>
+          <a:avLst/>
+          <a:gdLst/>
+          <a:ahLst/>
+          <a:cxnLst/>
+          <a:rect l="0" t="0" r="0" b="0"/>
+          <a:pathLst>
+            <a:path>
+              <a:moveTo>
+                <a:pt x="45720" y="0"/>
+              </a:moveTo>
+              <a:lnTo>
+                <a:pt x="45720" y="355254"/>
+              </a:lnTo>
+            </a:path>
+          </a:pathLst>
+        </a:custGeom>
+        <a:noFill/>
+        <a:ln w="34925" cap="flat" cmpd="sng" algn="in">
+          <a:solidFill>
+            <a:schemeClr val="accent4">
+              <a:hueOff val="0"/>
+              <a:satOff val="0"/>
+              <a:lumOff val="0"/>
+              <a:alphaOff val="0"/>
+            </a:schemeClr>
+          </a:solidFill>
+          <a:prstDash val="solid"/>
+        </a:ln>
+        <a:effectLst/>
+        <a:scene3d>
+          <a:camera prst="orthographicFront"/>
+          <a:lightRig rig="chilly" dir="t"/>
+        </a:scene3d>
+        <a:sp3d z="-40000" prstMaterial="matte"/>
+      </dsp:spPr>
+      <dsp:style>
+        <a:lnRef idx="2">
+          <a:scrgbClr r="0" g="0" b="0"/>
+        </a:lnRef>
+        <a:fillRef idx="0">
+          <a:scrgbClr r="0" g="0" b="0"/>
+        </a:fillRef>
+        <a:effectRef idx="0">
+          <a:scrgbClr r="0" g="0" b="0"/>
+        </a:effectRef>
+        <a:fontRef idx="minor"/>
+      </dsp:style>
+    </dsp:sp>
+    <dsp:sp modelId="{692E1C15-5EDE-45B5-A9AC-7A0D80148EC4}">
+      <dsp:nvSpPr>
+        <dsp:cNvPr id="0" name=""/>
+        <dsp:cNvSpPr/>
+      </dsp:nvSpPr>
+      <dsp:spPr>
+        <a:xfrm>
+          <a:off x="1220386" y="3912580"/>
+          <a:ext cx="1332202" cy="888135"/>
+        </a:xfrm>
+        <a:prstGeom prst="roundRect">
+          <a:avLst>
+            <a:gd name="adj" fmla="val 10000"/>
+          </a:avLst>
+        </a:prstGeom>
+        <a:solidFill>
+          <a:schemeClr val="accent4">
+            <a:hueOff val="0"/>
+            <a:satOff val="0"/>
+            <a:lumOff val="0"/>
+            <a:alphaOff val="0"/>
+          </a:schemeClr>
+        </a:solidFill>
+        <a:ln>
+          <a:noFill/>
+        </a:ln>
+        <a:effectLst/>
+        <a:scene3d>
+          <a:camera prst="orthographicFront"/>
+          <a:lightRig rig="chilly" dir="t"/>
+        </a:scene3d>
+        <a:sp3d prstMaterial="translucentPowder">
+          <a:bevelT w="127000" h="25400" prst="softRound"/>
+        </a:sp3d>
+      </dsp:spPr>
+      <dsp:style>
+        <a:lnRef idx="0">
+          <a:scrgbClr r="0" g="0" b="0"/>
+        </a:lnRef>
+        <a:fillRef idx="1">
+          <a:scrgbClr r="0" g="0" b="0"/>
+        </a:fillRef>
+        <a:effectRef idx="0">
+          <a:scrgbClr r="0" g="0" b="0"/>
+        </a:effectRef>
+        <a:fontRef idx="minor">
+          <a:schemeClr val="lt1"/>
+        </a:fontRef>
+      </dsp:style>
+      <dsp:txBody>
+        <a:bodyPr spcFirstLastPara="0" vert="horz" wrap="square" lIns="57150" tIns="57150" rIns="57150" bIns="57150" numCol="1" spcCol="1270" anchor="ctr" anchorCtr="0">
+          <a:noAutofit/>
+        </a:bodyPr>
+        <a:lstStyle/>
+        <a:p>
+          <a:pPr marL="0" lvl="0" indent="0" algn="ctr" defTabSz="666750">
+            <a:lnSpc>
+              <a:spcPct val="90000"/>
+            </a:lnSpc>
+            <a:spcBef>
+              <a:spcPct val="0"/>
+            </a:spcBef>
+            <a:spcAft>
+              <a:spcPct val="35000"/>
+            </a:spcAft>
+            <a:buNone/>
+          </a:pPr>
+          <a:r>
+            <a:rPr lang="es-AR" sz="1500" kern="1200" dirty="0"/>
+            <a:t>SYSTICK</a:t>
+          </a:r>
+        </a:p>
+      </dsp:txBody>
+      <dsp:txXfrm>
+        <a:off x="1246399" y="3938593"/>
+        <a:ext cx="1280176" cy="836109"/>
+      </dsp:txXfrm>
+    </dsp:sp>
+    <dsp:sp modelId="{53BE28EF-99A8-45D2-A439-B1144FBC3954}">
+      <dsp:nvSpPr>
+        <dsp:cNvPr id="0" name=""/>
+        <dsp:cNvSpPr/>
+      </dsp:nvSpPr>
+      <dsp:spPr>
+        <a:xfrm>
+          <a:off x="3609558" y="2313937"/>
+          <a:ext cx="141839" cy="355254"/>
+        </a:xfrm>
+        <a:custGeom>
+          <a:avLst/>
+          <a:gdLst/>
+          <a:ahLst/>
+          <a:cxnLst/>
+          <a:rect l="0" t="0" r="0" b="0"/>
+          <a:pathLst>
+            <a:path>
+              <a:moveTo>
+                <a:pt x="141839" y="0"/>
+              </a:moveTo>
+              <a:lnTo>
+                <a:pt x="141839" y="177627"/>
+              </a:lnTo>
+              <a:lnTo>
+                <a:pt x="0" y="177627"/>
+              </a:lnTo>
+              <a:lnTo>
+                <a:pt x="0" y="355254"/>
               </a:lnTo>
             </a:path>
           </a:pathLst>
@@ -4518,8 +4903,8 @@
       </dsp:nvSpPr>
       <dsp:spPr>
         <a:xfrm>
-          <a:off x="1869299" y="2642041"/>
-          <a:ext cx="1413653" cy="942435"/>
+          <a:off x="2943457" y="2669191"/>
+          <a:ext cx="1332202" cy="888135"/>
         </a:xfrm>
         <a:prstGeom prst="roundRect">
           <a:avLst>
@@ -4603,8 +4988,8 @@
         </a:p>
       </dsp:txBody>
       <dsp:txXfrm>
-        <a:off x="1896902" y="2669644"/>
-        <a:ext cx="1358447" cy="887229"/>
+        <a:off x="2969470" y="2695204"/>
+        <a:ext cx="1280176" cy="836109"/>
       </dsp:txXfrm>
     </dsp:sp>
     <dsp:sp modelId="{E6F5C1DA-D308-408B-88C1-7DE98E99F690}">
@@ -4614,8 +4999,8 @@
       </dsp:nvSpPr>
       <dsp:spPr>
         <a:xfrm>
-          <a:off x="2530405" y="3584476"/>
-          <a:ext cx="91440" cy="376974"/>
+          <a:off x="3563838" y="3557326"/>
+          <a:ext cx="91440" cy="355254"/>
         </a:xfrm>
         <a:custGeom>
           <a:avLst/>
@@ -4629,13 +5014,13 @@
                 <a:pt x="45720" y="0"/>
               </a:moveTo>
               <a:lnTo>
-                <a:pt x="45720" y="188487"/>
+                <a:pt x="45720" y="177627"/>
               </a:lnTo>
               <a:lnTo>
-                <a:pt x="55050" y="188487"/>
+                <a:pt x="54512" y="177627"/>
               </a:lnTo>
               <a:lnTo>
-                <a:pt x="55050" y="376974"/>
+                <a:pt x="54512" y="355254"/>
               </a:lnTo>
             </a:path>
           </a:pathLst>
@@ -4679,8 +5064,8 @@
       </dsp:nvSpPr>
       <dsp:spPr>
         <a:xfrm>
-          <a:off x="1878629" y="3961451"/>
-          <a:ext cx="1413653" cy="942435"/>
+          <a:off x="2952249" y="3912580"/>
+          <a:ext cx="1332202" cy="888135"/>
         </a:xfrm>
         <a:prstGeom prst="roundRect">
           <a:avLst>
@@ -4746,8 +5131,8 @@
         </a:p>
       </dsp:txBody>
       <dsp:txXfrm>
-        <a:off x="1906232" y="3989054"/>
-        <a:ext cx="1358447" cy="887229"/>
+        <a:off x="2978262" y="3938593"/>
+        <a:ext cx="1280176" cy="836109"/>
       </dsp:txXfrm>
     </dsp:sp>
     <dsp:sp modelId="{D2FA8DCC-89A3-4CB1-9FF9-7F8B664B0AF9}">
@@ -4757,8 +5142,8 @@
       </dsp:nvSpPr>
       <dsp:spPr>
         <a:xfrm>
-          <a:off x="2539735" y="4903886"/>
-          <a:ext cx="91440" cy="376974"/>
+          <a:off x="3572631" y="4800715"/>
+          <a:ext cx="91440" cy="355254"/>
         </a:xfrm>
         <a:custGeom>
           <a:avLst/>
@@ -4772,7 +5157,7 @@
                 <a:pt x="45720" y="0"/>
               </a:moveTo>
               <a:lnTo>
-                <a:pt x="45720" y="376974"/>
+                <a:pt x="45720" y="355254"/>
               </a:lnTo>
             </a:path>
           </a:pathLst>
@@ -4816,8 +5201,8 @@
       </dsp:nvSpPr>
       <dsp:spPr>
         <a:xfrm>
-          <a:off x="1878629" y="5280860"/>
-          <a:ext cx="1413653" cy="942435"/>
+          <a:off x="2952249" y="5155969"/>
+          <a:ext cx="1332202" cy="888135"/>
         </a:xfrm>
         <a:prstGeom prst="roundRect">
           <a:avLst>
@@ -4883,8 +5268,8 @@
         </a:p>
       </dsp:txBody>
       <dsp:txXfrm>
-        <a:off x="1906232" y="5308463"/>
-        <a:ext cx="1358447" cy="887229"/>
+        <a:off x="2978262" y="5181982"/>
+        <a:ext cx="1280176" cy="836109"/>
       </dsp:txXfrm>
     </dsp:sp>
     <dsp:sp modelId="{DDEF067D-8035-4EE8-B26D-F9EF3FCB2EBB}">
@@ -4894,8 +5279,8 @@
       </dsp:nvSpPr>
       <dsp:spPr>
         <a:xfrm>
-          <a:off x="3645512" y="2265066"/>
-          <a:ext cx="865056" cy="371677"/>
+          <a:off x="3751398" y="2313937"/>
+          <a:ext cx="1681146" cy="350262"/>
         </a:xfrm>
         <a:custGeom>
           <a:avLst/>
@@ -4909,13 +5294,13 @@
                 <a:pt x="0" y="0"/>
               </a:moveTo>
               <a:lnTo>
-                <a:pt x="0" y="185838"/>
+                <a:pt x="0" y="175131"/>
               </a:lnTo>
               <a:lnTo>
-                <a:pt x="865056" y="185838"/>
+                <a:pt x="1681146" y="175131"/>
               </a:lnTo>
               <a:lnTo>
-                <a:pt x="865056" y="371677"/>
+                <a:pt x="1681146" y="350262"/>
               </a:lnTo>
             </a:path>
           </a:pathLst>
@@ -4959,8 +5344,8 @@
       </dsp:nvSpPr>
       <dsp:spPr>
         <a:xfrm>
-          <a:off x="3662560" y="2636744"/>
-          <a:ext cx="1696016" cy="942435"/>
+          <a:off x="4633396" y="2664200"/>
+          <a:ext cx="1598296" cy="888135"/>
         </a:xfrm>
         <a:prstGeom prst="roundRect">
           <a:avLst>
@@ -5026,8 +5411,8 @@
         </a:p>
       </dsp:txBody>
       <dsp:txXfrm>
-        <a:off x="3690163" y="2664347"/>
-        <a:ext cx="1640810" cy="887229"/>
+        <a:off x="4659409" y="2690213"/>
+        <a:ext cx="1546270" cy="836109"/>
       </dsp:txXfrm>
     </dsp:sp>
     <dsp:sp modelId="{D15C5AB9-F1E9-4D5E-85C9-5C93CA672A4C}">
@@ -5037,8 +5422,8 @@
       </dsp:nvSpPr>
       <dsp:spPr>
         <a:xfrm>
-          <a:off x="4464849" y="3579180"/>
-          <a:ext cx="91440" cy="382270"/>
+          <a:off x="5386824" y="3552335"/>
+          <a:ext cx="91440" cy="360245"/>
         </a:xfrm>
         <a:custGeom>
           <a:avLst/>
@@ -5052,13 +5437,13 @@
                 <a:pt x="45720" y="0"/>
               </a:moveTo>
               <a:lnTo>
-                <a:pt x="45720" y="191135"/>
+                <a:pt x="45720" y="180122"/>
               </a:lnTo>
               <a:lnTo>
-                <a:pt x="99537" y="191135"/>
+                <a:pt x="96436" y="180122"/>
               </a:lnTo>
               <a:lnTo>
-                <a:pt x="99537" y="382270"/>
+                <a:pt x="96436" y="360245"/>
               </a:lnTo>
             </a:path>
           </a:pathLst>
@@ -5102,8 +5487,8 @@
       </dsp:nvSpPr>
       <dsp:spPr>
         <a:xfrm>
-          <a:off x="3857560" y="3961451"/>
-          <a:ext cx="1413653" cy="942435"/>
+          <a:off x="4817160" y="3912580"/>
+          <a:ext cx="1332202" cy="888135"/>
         </a:xfrm>
         <a:prstGeom prst="roundRect">
           <a:avLst>
@@ -5169,8 +5554,8 @@
         </a:p>
       </dsp:txBody>
       <dsp:txXfrm>
-        <a:off x="3885163" y="3989054"/>
-        <a:ext cx="1358447" cy="887229"/>
+        <a:off x="4843173" y="3938593"/>
+        <a:ext cx="1280176" cy="836109"/>
       </dsp:txXfrm>
     </dsp:sp>
     <dsp:sp modelId="{2B44D44D-9C15-4BE4-8857-6902DD216E02}">
@@ -5180,8 +5565,8 @@
       </dsp:nvSpPr>
       <dsp:spPr>
         <a:xfrm>
-          <a:off x="4464622" y="4903886"/>
-          <a:ext cx="91440" cy="346948"/>
+          <a:off x="5386611" y="4800715"/>
+          <a:ext cx="91440" cy="326958"/>
         </a:xfrm>
         <a:custGeom>
           <a:avLst/>
@@ -5192,16 +5577,16 @@
           <a:pathLst>
             <a:path>
               <a:moveTo>
-                <a:pt x="99763" y="0"/>
+                <a:pt x="96650" y="0"/>
               </a:moveTo>
               <a:lnTo>
-                <a:pt x="99763" y="173474"/>
+                <a:pt x="96650" y="163479"/>
               </a:lnTo>
               <a:lnTo>
-                <a:pt x="45720" y="173474"/>
+                <a:pt x="45720" y="163479"/>
               </a:lnTo>
               <a:lnTo>
-                <a:pt x="45720" y="346948"/>
+                <a:pt x="45720" y="326958"/>
               </a:lnTo>
             </a:path>
           </a:pathLst>
@@ -5245,8 +5630,8 @@
       </dsp:nvSpPr>
       <dsp:spPr>
         <a:xfrm>
-          <a:off x="3803516" y="5250834"/>
-          <a:ext cx="1413653" cy="942435"/>
+          <a:off x="4766230" y="5127673"/>
+          <a:ext cx="1332202" cy="888135"/>
         </a:xfrm>
         <a:prstGeom prst="roundRect">
           <a:avLst>
@@ -5312,8 +5697,8 @@
         </a:p>
       </dsp:txBody>
       <dsp:txXfrm>
-        <a:off x="3831119" y="5278437"/>
-        <a:ext cx="1358447" cy="887229"/>
+        <a:off x="4792243" y="5153686"/>
+        <a:ext cx="1280176" cy="836109"/>
       </dsp:txXfrm>
     </dsp:sp>
     <dsp:sp modelId="{6D500FE4-6E88-4115-B204-2A401C1E43A0}">
@@ -5323,8 +5708,8 @@
       </dsp:nvSpPr>
       <dsp:spPr>
         <a:xfrm>
-          <a:off x="5553852" y="945657"/>
-          <a:ext cx="1908340" cy="376974"/>
+          <a:off x="5982750" y="1070548"/>
+          <a:ext cx="2231352" cy="355254"/>
         </a:xfrm>
         <a:custGeom>
           <a:avLst/>
@@ -5338,13 +5723,13 @@
                 <a:pt x="0" y="0"/>
               </a:moveTo>
               <a:lnTo>
-                <a:pt x="0" y="188487"/>
+                <a:pt x="0" y="177627"/>
               </a:lnTo>
               <a:lnTo>
-                <a:pt x="1908340" y="188487"/>
+                <a:pt x="2231352" y="177627"/>
               </a:lnTo>
               <a:lnTo>
-                <a:pt x="1908340" y="376974"/>
+                <a:pt x="2231352" y="355254"/>
               </a:lnTo>
             </a:path>
           </a:pathLst>
@@ -5384,8 +5769,8 @@
       </dsp:nvSpPr>
       <dsp:spPr>
         <a:xfrm>
-          <a:off x="6755365" y="1322631"/>
-          <a:ext cx="1413653" cy="942435"/>
+          <a:off x="7548002" y="1425802"/>
+          <a:ext cx="1332202" cy="888135"/>
         </a:xfrm>
         <a:prstGeom prst="roundRect">
           <a:avLst>
@@ -5469,8 +5854,8 @@
         </a:p>
       </dsp:txBody>
       <dsp:txXfrm>
-        <a:off x="6782968" y="1350234"/>
-        <a:ext cx="1358447" cy="887229"/>
+        <a:off x="7574015" y="1451815"/>
+        <a:ext cx="1280176" cy="836109"/>
       </dsp:txXfrm>
     </dsp:sp>
     <dsp:sp modelId="{6DFBC8DC-FB04-4552-ACB4-2C723637561B}">
@@ -5480,8 +5865,8 @@
       </dsp:nvSpPr>
       <dsp:spPr>
         <a:xfrm>
-          <a:off x="6581246" y="2265066"/>
-          <a:ext cx="880946" cy="364336"/>
+          <a:off x="7383914" y="2313937"/>
+          <a:ext cx="830188" cy="343344"/>
         </a:xfrm>
         <a:custGeom>
           <a:avLst/>
@@ -5492,16 +5877,16 @@
           <a:pathLst>
             <a:path>
               <a:moveTo>
-                <a:pt x="880946" y="0"/>
+                <a:pt x="830188" y="0"/>
               </a:moveTo>
               <a:lnTo>
-                <a:pt x="880946" y="182168"/>
+                <a:pt x="830188" y="171672"/>
               </a:lnTo>
               <a:lnTo>
-                <a:pt x="0" y="182168"/>
+                <a:pt x="0" y="171672"/>
               </a:lnTo>
               <a:lnTo>
-                <a:pt x="0" y="364336"/>
+                <a:pt x="0" y="343344"/>
               </a:lnTo>
             </a:path>
           </a:pathLst>
@@ -5545,8 +5930,8 @@
       </dsp:nvSpPr>
       <dsp:spPr>
         <a:xfrm>
-          <a:off x="5874419" y="2629403"/>
-          <a:ext cx="1413653" cy="942435"/>
+          <a:off x="6717813" y="2657281"/>
+          <a:ext cx="1332202" cy="888135"/>
         </a:xfrm>
         <a:prstGeom prst="roundRect">
           <a:avLst>
@@ -5612,8 +5997,8 @@
         </a:p>
       </dsp:txBody>
       <dsp:txXfrm>
-        <a:off x="5902022" y="2657006"/>
-        <a:ext cx="1358447" cy="887229"/>
+        <a:off x="6743826" y="2683294"/>
+        <a:ext cx="1280176" cy="836109"/>
       </dsp:txXfrm>
     </dsp:sp>
     <dsp:sp modelId="{190E5C43-FF52-41EF-BC65-4C3846DF4B2F}">
@@ -5623,8 +6008,8 @@
       </dsp:nvSpPr>
       <dsp:spPr>
         <a:xfrm>
-          <a:off x="6497597" y="3571838"/>
-          <a:ext cx="91440" cy="389612"/>
+          <a:off x="7302451" y="3545416"/>
+          <a:ext cx="91440" cy="367163"/>
         </a:xfrm>
         <a:custGeom>
           <a:avLst/>
@@ -5635,16 +6020,16 @@
           <a:pathLst>
             <a:path>
               <a:moveTo>
-                <a:pt x="83648" y="0"/>
+                <a:pt x="81462" y="0"/>
               </a:moveTo>
               <a:lnTo>
-                <a:pt x="83648" y="194806"/>
+                <a:pt x="81462" y="183581"/>
               </a:lnTo>
               <a:lnTo>
-                <a:pt x="45720" y="194806"/>
+                <a:pt x="45720" y="183581"/>
               </a:lnTo>
               <a:lnTo>
-                <a:pt x="45720" y="389612"/>
+                <a:pt x="45720" y="367163"/>
               </a:lnTo>
             </a:path>
           </a:pathLst>
@@ -5688,8 +6073,294 @@
       </dsp:nvSpPr>
       <dsp:spPr>
         <a:xfrm>
-          <a:off x="5836491" y="3961451"/>
-          <a:ext cx="1413653" cy="942435"/>
+          <a:off x="6682070" y="3912580"/>
+          <a:ext cx="1332202" cy="888135"/>
+        </a:xfrm>
+        <a:prstGeom prst="roundRect">
+          <a:avLst>
+            <a:gd name="adj" fmla="val 10000"/>
+          </a:avLst>
+        </a:prstGeom>
+        <a:solidFill>
+          <a:schemeClr val="accent4">
+            <a:hueOff val="0"/>
+            <a:satOff val="0"/>
+            <a:lumOff val="0"/>
+            <a:alphaOff val="0"/>
+          </a:schemeClr>
+        </a:solidFill>
+        <a:ln>
+          <a:noFill/>
+        </a:ln>
+        <a:effectLst/>
+        <a:scene3d>
+          <a:camera prst="orthographicFront"/>
+          <a:lightRig rig="chilly" dir="t"/>
+        </a:scene3d>
+        <a:sp3d prstMaterial="translucentPowder">
+          <a:bevelT w="127000" h="25400" prst="softRound"/>
+        </a:sp3d>
+      </dsp:spPr>
+      <dsp:style>
+        <a:lnRef idx="0">
+          <a:scrgbClr r="0" g="0" b="0"/>
+        </a:lnRef>
+        <a:fillRef idx="1">
+          <a:scrgbClr r="0" g="0" b="0"/>
+        </a:fillRef>
+        <a:effectRef idx="0">
+          <a:scrgbClr r="0" g="0" b="0"/>
+        </a:effectRef>
+        <a:fontRef idx="minor">
+          <a:schemeClr val="lt1"/>
+        </a:fontRef>
+      </dsp:style>
+      <dsp:txBody>
+        <a:bodyPr spcFirstLastPara="0" vert="horz" wrap="square" lIns="57150" tIns="57150" rIns="57150" bIns="57150" numCol="1" spcCol="1270" anchor="ctr" anchorCtr="0">
+          <a:noAutofit/>
+        </a:bodyPr>
+        <a:lstStyle/>
+        <a:p>
+          <a:pPr marL="0" lvl="0" indent="0" algn="ctr" defTabSz="666750">
+            <a:lnSpc>
+              <a:spcPct val="90000"/>
+            </a:lnSpc>
+            <a:spcBef>
+              <a:spcPct val="0"/>
+            </a:spcBef>
+            <a:spcAft>
+              <a:spcPct val="35000"/>
+            </a:spcAft>
+            <a:buNone/>
+          </a:pPr>
+          <a:r>
+            <a:rPr lang="es-AR" sz="1500" kern="1200" dirty="0"/>
+            <a:t>GPIO</a:t>
+          </a:r>
+        </a:p>
+      </dsp:txBody>
+      <dsp:txXfrm>
+        <a:off x="6708083" y="3938593"/>
+        <a:ext cx="1280176" cy="836109"/>
+      </dsp:txXfrm>
+    </dsp:sp>
+    <dsp:sp modelId="{86087C67-4375-477E-84D1-836C1F14C793}">
+      <dsp:nvSpPr>
+        <dsp:cNvPr id="0" name=""/>
+        <dsp:cNvSpPr/>
+      </dsp:nvSpPr>
+      <dsp:spPr>
+        <a:xfrm>
+          <a:off x="8214103" y="2313937"/>
+          <a:ext cx="854274" cy="262701"/>
+        </a:xfrm>
+        <a:custGeom>
+          <a:avLst/>
+          <a:gdLst/>
+          <a:ahLst/>
+          <a:cxnLst/>
+          <a:rect l="0" t="0" r="0" b="0"/>
+          <a:pathLst>
+            <a:path>
+              <a:moveTo>
+                <a:pt x="0" y="0"/>
+              </a:moveTo>
+              <a:lnTo>
+                <a:pt x="0" y="131350"/>
+              </a:lnTo>
+              <a:lnTo>
+                <a:pt x="854274" y="131350"/>
+              </a:lnTo>
+              <a:lnTo>
+                <a:pt x="854274" y="262701"/>
+              </a:lnTo>
+            </a:path>
+          </a:pathLst>
+        </a:custGeom>
+        <a:noFill/>
+        <a:ln w="34925" cap="flat" cmpd="sng" algn="in">
+          <a:solidFill>
+            <a:schemeClr val="accent3">
+              <a:hueOff val="0"/>
+              <a:satOff val="0"/>
+              <a:lumOff val="0"/>
+              <a:alphaOff val="0"/>
+            </a:schemeClr>
+          </a:solidFill>
+          <a:prstDash val="solid"/>
+        </a:ln>
+        <a:effectLst/>
+        <a:scene3d>
+          <a:camera prst="orthographicFront"/>
+          <a:lightRig rig="chilly" dir="t"/>
+        </a:scene3d>
+        <a:sp3d z="-40000" prstMaterial="matte"/>
+      </dsp:spPr>
+      <dsp:style>
+        <a:lnRef idx="2">
+          <a:scrgbClr r="0" g="0" b="0"/>
+        </a:lnRef>
+        <a:fillRef idx="0">
+          <a:scrgbClr r="0" g="0" b="0"/>
+        </a:fillRef>
+        <a:effectRef idx="0">
+          <a:scrgbClr r="0" g="0" b="0"/>
+        </a:effectRef>
+        <a:fontRef idx="minor"/>
+      </dsp:style>
+    </dsp:sp>
+    <dsp:sp modelId="{A445E83A-B1D7-4754-AB40-1BD356E2B23A}">
+      <dsp:nvSpPr>
+        <dsp:cNvPr id="0" name=""/>
+        <dsp:cNvSpPr/>
+      </dsp:nvSpPr>
+      <dsp:spPr>
+        <a:xfrm>
+          <a:off x="8402277" y="2576638"/>
+          <a:ext cx="1332202" cy="888135"/>
+        </a:xfrm>
+        <a:prstGeom prst="roundRect">
+          <a:avLst>
+            <a:gd name="adj" fmla="val 10000"/>
+          </a:avLst>
+        </a:prstGeom>
+        <a:solidFill>
+          <a:schemeClr val="accent3">
+            <a:hueOff val="0"/>
+            <a:satOff val="0"/>
+            <a:lumOff val="0"/>
+            <a:alphaOff val="0"/>
+          </a:schemeClr>
+        </a:solidFill>
+        <a:ln>
+          <a:noFill/>
+        </a:ln>
+        <a:effectLst/>
+        <a:scene3d>
+          <a:camera prst="orthographicFront"/>
+          <a:lightRig rig="chilly" dir="t"/>
+        </a:scene3d>
+        <a:sp3d prstMaterial="translucentPowder">
+          <a:bevelT w="127000" h="25400" prst="softRound"/>
+        </a:sp3d>
+      </dsp:spPr>
+      <dsp:style>
+        <a:lnRef idx="0">
+          <a:scrgbClr r="0" g="0" b="0"/>
+        </a:lnRef>
+        <a:fillRef idx="1">
+          <a:scrgbClr r="0" g="0" b="0"/>
+        </a:fillRef>
+        <a:effectRef idx="0">
+          <a:scrgbClr r="0" g="0" b="0"/>
+        </a:effectRef>
+        <a:fontRef idx="minor">
+          <a:schemeClr val="lt1"/>
+        </a:fontRef>
+      </dsp:style>
+      <dsp:txBody>
+        <a:bodyPr spcFirstLastPara="0" vert="horz" wrap="square" lIns="57150" tIns="57150" rIns="57150" bIns="57150" numCol="1" spcCol="1270" anchor="ctr" anchorCtr="0">
+          <a:noAutofit/>
+        </a:bodyPr>
+        <a:lstStyle/>
+        <a:p>
+          <a:pPr marL="0" lvl="0" indent="0" algn="ctr" defTabSz="666750">
+            <a:lnSpc>
+              <a:spcPct val="90000"/>
+            </a:lnSpc>
+            <a:spcBef>
+              <a:spcPct val="0"/>
+            </a:spcBef>
+            <a:spcAft>
+              <a:spcPct val="35000"/>
+            </a:spcAft>
+            <a:buNone/>
+          </a:pPr>
+          <a:r>
+            <a:rPr lang="es-AR" sz="1500" kern="1200" dirty="0"/>
+            <a:t>TIMER</a:t>
+          </a:r>
+        </a:p>
+      </dsp:txBody>
+      <dsp:txXfrm>
+        <a:off x="8428290" y="2602651"/>
+        <a:ext cx="1280176" cy="836109"/>
+      </dsp:txXfrm>
+    </dsp:sp>
+    <dsp:sp modelId="{56CF0D79-9B69-422E-B55F-8C1B0E2FBF1A}">
+      <dsp:nvSpPr>
+        <dsp:cNvPr id="0" name=""/>
+        <dsp:cNvSpPr/>
+      </dsp:nvSpPr>
+      <dsp:spPr>
+        <a:xfrm>
+          <a:off x="9022658" y="3464773"/>
+          <a:ext cx="91440" cy="447806"/>
+        </a:xfrm>
+        <a:custGeom>
+          <a:avLst/>
+          <a:gdLst/>
+          <a:ahLst/>
+          <a:cxnLst/>
+          <a:rect l="0" t="0" r="0" b="0"/>
+          <a:pathLst>
+            <a:path>
+              <a:moveTo>
+                <a:pt x="45720" y="0"/>
+              </a:moveTo>
+              <a:lnTo>
+                <a:pt x="45720" y="223903"/>
+              </a:lnTo>
+              <a:lnTo>
+                <a:pt x="57376" y="223903"/>
+              </a:lnTo>
+              <a:lnTo>
+                <a:pt x="57376" y="447806"/>
+              </a:lnTo>
+            </a:path>
+          </a:pathLst>
+        </a:custGeom>
+        <a:noFill/>
+        <a:ln w="34925" cap="flat" cmpd="sng" algn="in">
+          <a:solidFill>
+            <a:schemeClr val="accent4">
+              <a:hueOff val="0"/>
+              <a:satOff val="0"/>
+              <a:lumOff val="0"/>
+              <a:alphaOff val="0"/>
+            </a:schemeClr>
+          </a:solidFill>
+          <a:prstDash val="solid"/>
+        </a:ln>
+        <a:effectLst/>
+        <a:scene3d>
+          <a:camera prst="orthographicFront"/>
+          <a:lightRig rig="chilly" dir="t"/>
+        </a:scene3d>
+        <a:sp3d z="-40000" prstMaterial="matte"/>
+      </dsp:spPr>
+      <dsp:style>
+        <a:lnRef idx="2">
+          <a:scrgbClr r="0" g="0" b="0"/>
+        </a:lnRef>
+        <a:fillRef idx="0">
+          <a:scrgbClr r="0" g="0" b="0"/>
+        </a:fillRef>
+        <a:effectRef idx="0">
+          <a:scrgbClr r="0" g="0" b="0"/>
+        </a:effectRef>
+        <a:fontRef idx="minor"/>
+      </dsp:style>
+    </dsp:sp>
+    <dsp:sp modelId="{EFADDF6B-06F5-45B8-838D-F3A345604137}">
+      <dsp:nvSpPr>
+        <dsp:cNvPr id="0" name=""/>
+        <dsp:cNvSpPr/>
+      </dsp:nvSpPr>
+      <dsp:spPr>
+        <a:xfrm>
+          <a:off x="8413934" y="3912580"/>
+          <a:ext cx="1332202" cy="888135"/>
         </a:xfrm>
         <a:prstGeom prst="roundRect">
           <a:avLst>
@@ -5755,294 +6426,8 @@
         </a:p>
       </dsp:txBody>
       <dsp:txXfrm>
-        <a:off x="5864094" y="3989054"/>
-        <a:ext cx="1358447" cy="887229"/>
-      </dsp:txXfrm>
-    </dsp:sp>
-    <dsp:sp modelId="{86087C67-4375-477E-84D1-836C1F14C793}">
-      <dsp:nvSpPr>
-        <dsp:cNvPr id="0" name=""/>
-        <dsp:cNvSpPr/>
-      </dsp:nvSpPr>
-      <dsp:spPr>
-        <a:xfrm>
-          <a:off x="7462192" y="2265066"/>
-          <a:ext cx="906505" cy="278763"/>
-        </a:xfrm>
-        <a:custGeom>
-          <a:avLst/>
-          <a:gdLst/>
-          <a:ahLst/>
-          <a:cxnLst/>
-          <a:rect l="0" t="0" r="0" b="0"/>
-          <a:pathLst>
-            <a:path>
-              <a:moveTo>
-                <a:pt x="0" y="0"/>
-              </a:moveTo>
-              <a:lnTo>
-                <a:pt x="0" y="139381"/>
-              </a:lnTo>
-              <a:lnTo>
-                <a:pt x="906505" y="139381"/>
-              </a:lnTo>
-              <a:lnTo>
-                <a:pt x="906505" y="278763"/>
-              </a:lnTo>
-            </a:path>
-          </a:pathLst>
-        </a:custGeom>
-        <a:noFill/>
-        <a:ln w="34925" cap="flat" cmpd="sng" algn="in">
-          <a:solidFill>
-            <a:schemeClr val="accent3">
-              <a:hueOff val="0"/>
-              <a:satOff val="0"/>
-              <a:lumOff val="0"/>
-              <a:alphaOff val="0"/>
-            </a:schemeClr>
-          </a:solidFill>
-          <a:prstDash val="solid"/>
-        </a:ln>
-        <a:effectLst/>
-        <a:scene3d>
-          <a:camera prst="orthographicFront"/>
-          <a:lightRig rig="chilly" dir="t"/>
-        </a:scene3d>
-        <a:sp3d z="-40000" prstMaterial="matte"/>
-      </dsp:spPr>
-      <dsp:style>
-        <a:lnRef idx="2">
-          <a:scrgbClr r="0" g="0" b="0"/>
-        </a:lnRef>
-        <a:fillRef idx="0">
-          <a:scrgbClr r="0" g="0" b="0"/>
-        </a:fillRef>
-        <a:effectRef idx="0">
-          <a:scrgbClr r="0" g="0" b="0"/>
-        </a:effectRef>
-        <a:fontRef idx="minor"/>
-      </dsp:style>
-    </dsp:sp>
-    <dsp:sp modelId="{A445E83A-B1D7-4754-AB40-1BD356E2B23A}">
-      <dsp:nvSpPr>
-        <dsp:cNvPr id="0" name=""/>
-        <dsp:cNvSpPr/>
-      </dsp:nvSpPr>
-      <dsp:spPr>
-        <a:xfrm>
-          <a:off x="7661870" y="2543830"/>
-          <a:ext cx="1413653" cy="942435"/>
-        </a:xfrm>
-        <a:prstGeom prst="roundRect">
-          <a:avLst>
-            <a:gd name="adj" fmla="val 10000"/>
-          </a:avLst>
-        </a:prstGeom>
-        <a:solidFill>
-          <a:schemeClr val="accent3">
-            <a:hueOff val="0"/>
-            <a:satOff val="0"/>
-            <a:lumOff val="0"/>
-            <a:alphaOff val="0"/>
-          </a:schemeClr>
-        </a:solidFill>
-        <a:ln>
-          <a:noFill/>
-        </a:ln>
-        <a:effectLst/>
-        <a:scene3d>
-          <a:camera prst="orthographicFront"/>
-          <a:lightRig rig="chilly" dir="t"/>
-        </a:scene3d>
-        <a:sp3d prstMaterial="translucentPowder">
-          <a:bevelT w="127000" h="25400" prst="softRound"/>
-        </a:sp3d>
-      </dsp:spPr>
-      <dsp:style>
-        <a:lnRef idx="0">
-          <a:scrgbClr r="0" g="0" b="0"/>
-        </a:lnRef>
-        <a:fillRef idx="1">
-          <a:scrgbClr r="0" g="0" b="0"/>
-        </a:fillRef>
-        <a:effectRef idx="0">
-          <a:scrgbClr r="0" g="0" b="0"/>
-        </a:effectRef>
-        <a:fontRef idx="minor">
-          <a:schemeClr val="lt1"/>
-        </a:fontRef>
-      </dsp:style>
-      <dsp:txBody>
-        <a:bodyPr spcFirstLastPara="0" vert="horz" wrap="square" lIns="57150" tIns="57150" rIns="57150" bIns="57150" numCol="1" spcCol="1270" anchor="ctr" anchorCtr="0">
-          <a:noAutofit/>
-        </a:bodyPr>
-        <a:lstStyle/>
-        <a:p>
-          <a:pPr marL="0" lvl="0" indent="0" algn="ctr" defTabSz="666750">
-            <a:lnSpc>
-              <a:spcPct val="90000"/>
-            </a:lnSpc>
-            <a:spcBef>
-              <a:spcPct val="0"/>
-            </a:spcBef>
-            <a:spcAft>
-              <a:spcPct val="35000"/>
-            </a:spcAft>
-            <a:buNone/>
-          </a:pPr>
-          <a:r>
-            <a:rPr lang="es-AR" sz="1500" kern="1200" dirty="0"/>
-            <a:t>TIMER</a:t>
-          </a:r>
-        </a:p>
-      </dsp:txBody>
-      <dsp:txXfrm>
-        <a:off x="7689473" y="2571433"/>
-        <a:ext cx="1358447" cy="887229"/>
-      </dsp:txXfrm>
-    </dsp:sp>
-    <dsp:sp modelId="{56CF0D79-9B69-422E-B55F-8C1B0E2FBF1A}">
-      <dsp:nvSpPr>
-        <dsp:cNvPr id="0" name=""/>
-        <dsp:cNvSpPr/>
-      </dsp:nvSpPr>
-      <dsp:spPr>
-        <a:xfrm>
-          <a:off x="8322977" y="3486265"/>
-          <a:ext cx="91440" cy="475185"/>
-        </a:xfrm>
-        <a:custGeom>
-          <a:avLst/>
-          <a:gdLst/>
-          <a:ahLst/>
-          <a:cxnLst/>
-          <a:rect l="0" t="0" r="0" b="0"/>
-          <a:pathLst>
-            <a:path>
-              <a:moveTo>
-                <a:pt x="45720" y="0"/>
-              </a:moveTo>
-              <a:lnTo>
-                <a:pt x="45720" y="237592"/>
-              </a:lnTo>
-              <a:lnTo>
-                <a:pt x="58089" y="237592"/>
-              </a:lnTo>
-              <a:lnTo>
-                <a:pt x="58089" y="475185"/>
-              </a:lnTo>
-            </a:path>
-          </a:pathLst>
-        </a:custGeom>
-        <a:noFill/>
-        <a:ln w="34925" cap="flat" cmpd="sng" algn="in">
-          <a:solidFill>
-            <a:schemeClr val="accent4">
-              <a:hueOff val="0"/>
-              <a:satOff val="0"/>
-              <a:lumOff val="0"/>
-              <a:alphaOff val="0"/>
-            </a:schemeClr>
-          </a:solidFill>
-          <a:prstDash val="solid"/>
-        </a:ln>
-        <a:effectLst/>
-        <a:scene3d>
-          <a:camera prst="orthographicFront"/>
-          <a:lightRig rig="chilly" dir="t"/>
-        </a:scene3d>
-        <a:sp3d z="-40000" prstMaterial="matte"/>
-      </dsp:spPr>
-      <dsp:style>
-        <a:lnRef idx="2">
-          <a:scrgbClr r="0" g="0" b="0"/>
-        </a:lnRef>
-        <a:fillRef idx="0">
-          <a:scrgbClr r="0" g="0" b="0"/>
-        </a:fillRef>
-        <a:effectRef idx="0">
-          <a:scrgbClr r="0" g="0" b="0"/>
-        </a:effectRef>
-        <a:fontRef idx="minor"/>
-      </dsp:style>
-    </dsp:sp>
-    <dsp:sp modelId="{EFADDF6B-06F5-45B8-838D-F3A345604137}">
-      <dsp:nvSpPr>
-        <dsp:cNvPr id="0" name=""/>
-        <dsp:cNvSpPr/>
-      </dsp:nvSpPr>
-      <dsp:spPr>
-        <a:xfrm>
-          <a:off x="7674240" y="3961451"/>
-          <a:ext cx="1413653" cy="942435"/>
-        </a:xfrm>
-        <a:prstGeom prst="roundRect">
-          <a:avLst>
-            <a:gd name="adj" fmla="val 10000"/>
-          </a:avLst>
-        </a:prstGeom>
-        <a:solidFill>
-          <a:schemeClr val="accent4">
-            <a:hueOff val="0"/>
-            <a:satOff val="0"/>
-            <a:lumOff val="0"/>
-            <a:alphaOff val="0"/>
-          </a:schemeClr>
-        </a:solidFill>
-        <a:ln>
-          <a:noFill/>
-        </a:ln>
-        <a:effectLst/>
-        <a:scene3d>
-          <a:camera prst="orthographicFront"/>
-          <a:lightRig rig="chilly" dir="t"/>
-        </a:scene3d>
-        <a:sp3d prstMaterial="translucentPowder">
-          <a:bevelT w="127000" h="25400" prst="softRound"/>
-        </a:sp3d>
-      </dsp:spPr>
-      <dsp:style>
-        <a:lnRef idx="0">
-          <a:scrgbClr r="0" g="0" b="0"/>
-        </a:lnRef>
-        <a:fillRef idx="1">
-          <a:scrgbClr r="0" g="0" b="0"/>
-        </a:fillRef>
-        <a:effectRef idx="0">
-          <a:scrgbClr r="0" g="0" b="0"/>
-        </a:effectRef>
-        <a:fontRef idx="minor">
-          <a:schemeClr val="lt1"/>
-        </a:fontRef>
-      </dsp:style>
-      <dsp:txBody>
-        <a:bodyPr spcFirstLastPara="0" vert="horz" wrap="square" lIns="57150" tIns="57150" rIns="57150" bIns="57150" numCol="1" spcCol="1270" anchor="ctr" anchorCtr="0">
-          <a:noAutofit/>
-        </a:bodyPr>
-        <a:lstStyle/>
-        <a:p>
-          <a:pPr marL="0" lvl="0" indent="0" algn="ctr" defTabSz="666750">
-            <a:lnSpc>
-              <a:spcPct val="90000"/>
-            </a:lnSpc>
-            <a:spcBef>
-              <a:spcPct val="0"/>
-            </a:spcBef>
-            <a:spcAft>
-              <a:spcPct val="35000"/>
-            </a:spcAft>
-            <a:buNone/>
-          </a:pPr>
-          <a:r>
-            <a:rPr lang="es-AR" sz="1500" kern="1200" dirty="0"/>
-            <a:t>SYSTICK</a:t>
-          </a:r>
-        </a:p>
-      </dsp:txBody>
-      <dsp:txXfrm>
-        <a:off x="7701843" y="3989054"/>
-        <a:ext cx="1358447" cy="887229"/>
+        <a:off x="8439947" y="3938593"/>
+        <a:ext cx="1280176" cy="836109"/>
       </dsp:txXfrm>
     </dsp:sp>
   </dsp:spTree>
@@ -11825,7 +12210,7 @@
             <a:fld id="{87DE6118-2437-4B30-8E3C-4D2BE6020583}" type="datetimeFigureOut">
               <a:rPr lang="en-US" dirty="0"/>
               <a:pPr/>
-              <a:t>07-Oct-19</a:t>
+              <a:t>10/7/2019</a:t>
             </a:fld>
             <a:endParaRPr lang="en-US" dirty="0"/>
           </a:p>
@@ -11894,7 +12279,7 @@
             <a:fld id="{69E57DC2-970A-4B3E-BB1C-7A09969E49DF}" type="slidenum">
               <a:rPr lang="en-US" dirty="0"/>
               <a:pPr/>
-              <a:t>‹#›</a:t>
+              <a:t>‹Nº›</a:t>
             </a:fld>
             <a:endParaRPr lang="en-US" dirty="0"/>
           </a:p>
@@ -12151,7 +12536,7 @@
           <a:p>
             <a:fld id="{87DE6118-2437-4B30-8E3C-4D2BE6020583}" type="datetimeFigureOut">
               <a:rPr lang="en-US" dirty="0"/>
-              <a:t>07-Oct-19</a:t>
+              <a:t>10/7/2019</a:t>
             </a:fld>
             <a:endParaRPr lang="en-US" dirty="0"/>
           </a:p>
@@ -12193,7 +12578,7 @@
           <a:p>
             <a:fld id="{69E57DC2-970A-4B3E-BB1C-7A09969E49DF}" type="slidenum">
               <a:rPr lang="en-US" dirty="0"/>
-              <a:t>‹#›</a:t>
+              <a:t>‹Nº›</a:t>
             </a:fld>
             <a:endParaRPr lang="en-US" dirty="0"/>
           </a:p>
@@ -12326,7 +12711,7 @@
           <a:p>
             <a:fld id="{87DE6118-2437-4B30-8E3C-4D2BE6020583}" type="datetimeFigureOut">
               <a:rPr lang="en-US" dirty="0"/>
-              <a:t>07-Oct-19</a:t>
+              <a:t>10/7/2019</a:t>
             </a:fld>
             <a:endParaRPr lang="en-US" dirty="0"/>
           </a:p>
@@ -12368,7 +12753,7 @@
           <a:p>
             <a:fld id="{69E57DC2-970A-4B3E-BB1C-7A09969E49DF}" type="slidenum">
               <a:rPr lang="en-US" dirty="0"/>
-              <a:t>‹#›</a:t>
+              <a:t>‹Nº›</a:t>
             </a:fld>
             <a:endParaRPr lang="en-US" dirty="0"/>
           </a:p>
@@ -12491,7 +12876,7 @@
           <a:p>
             <a:fld id="{87DE6118-2437-4B30-8E3C-4D2BE6020583}" type="datetimeFigureOut">
               <a:rPr lang="en-US" dirty="0"/>
-              <a:t>07-Oct-19</a:t>
+              <a:t>10/7/2019</a:t>
             </a:fld>
             <a:endParaRPr lang="en-US" dirty="0"/>
           </a:p>
@@ -12533,7 +12918,7 @@
           <a:p>
             <a:fld id="{69E57DC2-970A-4B3E-BB1C-7A09969E49DF}" type="slidenum">
               <a:rPr lang="en-US" dirty="0"/>
-              <a:t>‹#›</a:t>
+              <a:t>‹Nº›</a:t>
             </a:fld>
             <a:endParaRPr lang="en-US" dirty="0"/>
           </a:p>
@@ -12764,7 +13149,7 @@
             <a:fld id="{87DE6118-2437-4B30-8E3C-4D2BE6020583}" type="datetimeFigureOut">
               <a:rPr lang="en-US" dirty="0"/>
               <a:pPr/>
-              <a:t>07-Oct-19</a:t>
+              <a:t>10/7/2019</a:t>
             </a:fld>
             <a:endParaRPr lang="en-US" dirty="0"/>
           </a:p>
@@ -12833,7 +13218,7 @@
             <a:fld id="{69E57DC2-970A-4B3E-BB1C-7A09969E49DF}" type="slidenum">
               <a:rPr lang="en-US" dirty="0"/>
               <a:pPr/>
-              <a:t>‹#›</a:t>
+              <a:t>‹Nº›</a:t>
             </a:fld>
             <a:endParaRPr lang="en-US" dirty="0"/>
           </a:p>
@@ -13154,7 +13539,7 @@
           <a:p>
             <a:fld id="{87DE6118-2437-4B30-8E3C-4D2BE6020583}" type="datetimeFigureOut">
               <a:rPr lang="en-US" dirty="0"/>
-              <a:t>07-Oct-19</a:t>
+              <a:t>10/7/2019</a:t>
             </a:fld>
             <a:endParaRPr lang="en-US" dirty="0"/>
           </a:p>
@@ -13196,7 +13581,7 @@
           <a:p>
             <a:fld id="{69E57DC2-970A-4B3E-BB1C-7A09969E49DF}" type="slidenum">
               <a:rPr lang="en-US" dirty="0"/>
-              <a:t>‹#›</a:t>
+              <a:t>‹Nº›</a:t>
             </a:fld>
             <a:endParaRPr lang="en-US" dirty="0"/>
           </a:p>
@@ -13626,7 +14011,7 @@
           <a:p>
             <a:fld id="{87DE6118-2437-4B30-8E3C-4D2BE6020583}" type="datetimeFigureOut">
               <a:rPr lang="en-US" dirty="0"/>
-              <a:t>07-Oct-19</a:t>
+              <a:t>10/7/2019</a:t>
             </a:fld>
             <a:endParaRPr lang="en-US" dirty="0"/>
           </a:p>
@@ -13668,7 +14053,7 @@
           <a:p>
             <a:fld id="{69E57DC2-970A-4B3E-BB1C-7A09969E49DF}" type="slidenum">
               <a:rPr lang="en-US" dirty="0"/>
-              <a:t>‹#›</a:t>
+              <a:t>‹Nº›</a:t>
             </a:fld>
             <a:endParaRPr lang="en-US" dirty="0"/>
           </a:p>
@@ -13739,7 +14124,7 @@
           <a:p>
             <a:fld id="{87DE6118-2437-4B30-8E3C-4D2BE6020583}" type="datetimeFigureOut">
               <a:rPr lang="en-US" dirty="0"/>
-              <a:t>07-Oct-19</a:t>
+              <a:t>10/7/2019</a:t>
             </a:fld>
             <a:endParaRPr lang="en-US" dirty="0"/>
           </a:p>
@@ -13781,7 +14166,7 @@
           <a:p>
             <a:fld id="{69E57DC2-970A-4B3E-BB1C-7A09969E49DF}" type="slidenum">
               <a:rPr lang="en-US" dirty="0"/>
-              <a:t>‹#›</a:t>
+              <a:t>‹Nº›</a:t>
             </a:fld>
             <a:endParaRPr lang="en-US" dirty="0"/>
           </a:p>
@@ -13829,7 +14214,7 @@
           <a:p>
             <a:fld id="{87DE6118-2437-4B30-8E3C-4D2BE6020583}" type="datetimeFigureOut">
               <a:rPr lang="en-US" dirty="0"/>
-              <a:t>07-Oct-19</a:t>
+              <a:t>10/7/2019</a:t>
             </a:fld>
             <a:endParaRPr lang="en-US" dirty="0"/>
           </a:p>
@@ -13871,7 +14256,7 @@
           <a:p>
             <a:fld id="{69E57DC2-970A-4B3E-BB1C-7A09969E49DF}" type="slidenum">
               <a:rPr lang="en-US" dirty="0"/>
-              <a:t>‹#›</a:t>
+              <a:t>‹Nº›</a:t>
             </a:fld>
             <a:endParaRPr lang="en-US" dirty="0"/>
           </a:p>
@@ -14171,7 +14556,7 @@
             <a:fld id="{87DE6118-2437-4B30-8E3C-4D2BE6020583}" type="datetimeFigureOut">
               <a:rPr lang="en-US" dirty="0"/>
               <a:pPr/>
-              <a:t>07-Oct-19</a:t>
+              <a:t>10/7/2019</a:t>
             </a:fld>
             <a:endParaRPr lang="en-US" dirty="0"/>
           </a:p>
@@ -14240,7 +14625,7 @@
             <a:fld id="{69E57DC2-970A-4B3E-BB1C-7A09969E49DF}" type="slidenum">
               <a:rPr lang="en-US" dirty="0"/>
               <a:pPr/>
-              <a:t>‹#›</a:t>
+              <a:t>‹Nº›</a:t>
             </a:fld>
             <a:endParaRPr lang="en-US" dirty="0"/>
           </a:p>
@@ -14556,7 +14941,7 @@
             <a:fld id="{87DE6118-2437-4B30-8E3C-4D2BE6020583}" type="datetimeFigureOut">
               <a:rPr lang="en-US" dirty="0"/>
               <a:pPr/>
-              <a:t>07-Oct-19</a:t>
+              <a:t>10/7/2019</a:t>
             </a:fld>
             <a:endParaRPr lang="en-US" dirty="0"/>
           </a:p>
@@ -14625,7 +15010,7 @@
             <a:fld id="{69E57DC2-970A-4B3E-BB1C-7A09969E49DF}" type="slidenum">
               <a:rPr lang="en-US" dirty="0"/>
               <a:pPr/>
-              <a:t>‹#›</a:t>
+              <a:t>‹Nº›</a:t>
             </a:fld>
             <a:endParaRPr lang="en-US" dirty="0"/>
           </a:p>
@@ -14831,7 +15216,7 @@
             <a:fld id="{87DE6118-2437-4B30-8E3C-4D2BE6020583}" type="datetimeFigureOut">
               <a:rPr lang="en-US" dirty="0"/>
               <a:pPr/>
-              <a:t>07-Oct-19</a:t>
+              <a:t>10/7/2019</a:t>
             </a:fld>
             <a:endParaRPr lang="en-US" dirty="0"/>
           </a:p>
@@ -14906,7 +15291,7 @@
             <a:fld id="{69E57DC2-970A-4B3E-BB1C-7A09969E49DF}" type="slidenum">
               <a:rPr lang="en-US" dirty="0"/>
               <a:pPr/>
-              <a:t>‹#›</a:t>
+              <a:t>‹Nº›</a:t>
             </a:fld>
             <a:endParaRPr lang="en-US" dirty="0"/>
           </a:p>
@@ -15469,6 +15854,99 @@
       </p:grpSpPr>
       <p:sp>
         <p:nvSpPr>
+          <p:cNvPr id="7" name="Title 3">
+            <a:extLst>
+              <a:ext uri="{FF2B5EF4-FFF2-40B4-BE49-F238E27FC236}">
+                <a16:creationId xmlns:a16="http://schemas.microsoft.com/office/drawing/2014/main" id="{232AF6AD-C5B1-4F78-B40F-4A56E0BFFE0D}"/>
+              </a:ext>
+            </a:extLst>
+          </p:cNvPr>
+          <p:cNvSpPr>
+            <a:spLocks noGrp="1"/>
+          </p:cNvSpPr>
+          <p:nvPr>
+            <p:ph type="ctrTitle"/>
+          </p:nvPr>
+        </p:nvSpPr>
+        <p:spPr>
+          <a:xfrm>
+            <a:off x="4373091" y="238996"/>
+            <a:ext cx="6831673" cy="1086238"/>
+          </a:xfrm>
+        </p:spPr>
+        <p:txBody>
+          <a:bodyPr/>
+          <a:lstStyle/>
+          <a:p>
+            <a:r>
+              <a:rPr lang="es-AR" cap="none" dirty="0"/>
+              <a:t>FXOS8700CQ.h</a:t>
+            </a:r>
+          </a:p>
+        </p:txBody>
+      </p:sp>
+      <p:pic>
+        <p:nvPicPr>
+          <p:cNvPr id="2" name="Picture 1">
+            <a:extLst>
+              <a:ext uri="{FF2B5EF4-FFF2-40B4-BE49-F238E27FC236}">
+                <a16:creationId xmlns:a16="http://schemas.microsoft.com/office/drawing/2014/main" id="{4F8A8A3A-FD07-4AE3-A78E-B404D2452D8C}"/>
+              </a:ext>
+            </a:extLst>
+          </p:cNvPr>
+          <p:cNvPicPr>
+            <a:picLocks noChangeAspect="1"/>
+          </p:cNvPicPr>
+          <p:nvPr/>
+        </p:nvPicPr>
+        <p:blipFill>
+          <a:blip r:embed="rId2"/>
+          <a:stretch>
+            <a:fillRect/>
+          </a:stretch>
+        </p:blipFill>
+        <p:spPr>
+          <a:xfrm>
+            <a:off x="2631141" y="1203157"/>
+            <a:ext cx="6929717" cy="4451685"/>
+          </a:xfrm>
+          <a:prstGeom prst="rect">
+            <a:avLst/>
+          </a:prstGeom>
+        </p:spPr>
+      </p:pic>
+    </p:spTree>
+    <p:extLst>
+      <p:ext uri="{BB962C8B-B14F-4D97-AF65-F5344CB8AC3E}">
+        <p14:creationId xmlns:p14="http://schemas.microsoft.com/office/powerpoint/2010/main" val="2943568953"/>
+      </p:ext>
+    </p:extLst>
+  </p:cSld>
+  <p:clrMapOvr>
+    <a:masterClrMapping/>
+  </p:clrMapOvr>
+</p:sld>
+</file>
+
+<file path=ppt/slides/slide11.xml><?xml version="1.0" encoding="utf-8"?>
+<p:sld xmlns:a="http://schemas.openxmlformats.org/drawingml/2006/main" xmlns:r="http://schemas.openxmlformats.org/officeDocument/2006/relationships" xmlns:p="http://schemas.openxmlformats.org/presentationml/2006/main">
+  <p:cSld>
+    <p:spTree>
+      <p:nvGrpSpPr>
+        <p:cNvPr id="1" name=""/>
+        <p:cNvGrpSpPr/>
+        <p:nvPr/>
+      </p:nvGrpSpPr>
+      <p:grpSpPr>
+        <a:xfrm>
+          <a:off x="0" y="0"/>
+          <a:ext cx="0" cy="0"/>
+          <a:chOff x="0" y="0"/>
+          <a:chExt cx="0" cy="0"/>
+        </a:xfrm>
+      </p:grpSpPr>
+      <p:sp>
+        <p:nvSpPr>
           <p:cNvPr id="4" name="Title 3">
             <a:extLst>
               <a:ext uri="{FF2B5EF4-FFF2-40B4-BE49-F238E27FC236}">
@@ -15675,7 +16153,7 @@
 </p:sld>
 </file>
 
-<file path=ppt/slides/slide11.xml><?xml version="1.0" encoding="utf-8"?>
+<file path=ppt/slides/slide12.xml><?xml version="1.0" encoding="utf-8"?>
 <p:sld xmlns:a="http://schemas.openxmlformats.org/drawingml/2006/main" xmlns:r="http://schemas.openxmlformats.org/officeDocument/2006/relationships" xmlns:p="http://schemas.openxmlformats.org/presentationml/2006/main">
   <p:cSld>
     <p:spTree>
@@ -15692,72 +16170,12 @@
           <a:chExt cx="0" cy="0"/>
         </a:xfrm>
       </p:grpSpPr>
-      <p:pic>
-        <p:nvPicPr>
-          <p:cNvPr id="5" name="Picture 4">
+      <p:sp>
+        <p:nvSpPr>
+          <p:cNvPr id="2" name="Título 1">
             <a:extLst>
               <a:ext uri="{FF2B5EF4-FFF2-40B4-BE49-F238E27FC236}">
-                <a16:creationId xmlns:a16="http://schemas.microsoft.com/office/drawing/2014/main" id="{06C528F2-8CBA-4D27-8AFD-D2D401B151C9}"/>
-              </a:ext>
-            </a:extLst>
-          </p:cNvPr>
-          <p:cNvPicPr>
-            <a:picLocks noChangeAspect="1"/>
-          </p:cNvPicPr>
-          <p:nvPr/>
-        </p:nvPicPr>
-        <p:blipFill>
-          <a:blip r:embed="rId2"/>
-          <a:stretch>
-            <a:fillRect/>
-          </a:stretch>
-        </p:blipFill>
-        <p:spPr>
-          <a:xfrm>
-            <a:off x="5546746" y="28472"/>
-            <a:ext cx="6096001" cy="6801055"/>
-          </a:xfrm>
-          <a:prstGeom prst="rect">
-            <a:avLst/>
-          </a:prstGeom>
-        </p:spPr>
-      </p:pic>
-      <p:pic>
-        <p:nvPicPr>
-          <p:cNvPr id="6" name="Picture 5">
-            <a:extLst>
-              <a:ext uri="{FF2B5EF4-FFF2-40B4-BE49-F238E27FC236}">
-                <a16:creationId xmlns:a16="http://schemas.microsoft.com/office/drawing/2014/main" id="{2F5030C9-BC8F-4598-829C-E929536DB030}"/>
-              </a:ext>
-            </a:extLst>
-          </p:cNvPr>
-          <p:cNvPicPr>
-            <a:picLocks noChangeAspect="1"/>
-          </p:cNvPicPr>
-          <p:nvPr/>
-        </p:nvPicPr>
-        <p:blipFill>
-          <a:blip r:embed="rId3"/>
-          <a:stretch>
-            <a:fillRect/>
-          </a:stretch>
-        </p:blipFill>
-        <p:spPr>
-          <a:xfrm>
-            <a:off x="1128962" y="3619351"/>
-            <a:ext cx="3045595" cy="1485042"/>
-          </a:xfrm>
-          <a:prstGeom prst="rect">
-            <a:avLst/>
-          </a:prstGeom>
-        </p:spPr>
-      </p:pic>
-      <p:sp>
-        <p:nvSpPr>
-          <p:cNvPr id="7" name="Title 3">
-            <a:extLst>
-              <a:ext uri="{FF2B5EF4-FFF2-40B4-BE49-F238E27FC236}">
-                <a16:creationId xmlns:a16="http://schemas.microsoft.com/office/drawing/2014/main" id="{232AF6AD-C5B1-4F78-B40F-4A56E0BFFE0D}"/>
+                <a16:creationId xmlns:a16="http://schemas.microsoft.com/office/drawing/2014/main" id="{F92CF671-1E1C-418E-9C44-A1784B984263}"/>
               </a:ext>
             </a:extLst>
           </p:cNvPr>
@@ -15770,26 +16188,131 @@
         </p:nvSpPr>
         <p:spPr>
           <a:xfrm>
-            <a:off x="549253" y="1752749"/>
-            <a:ext cx="4542700" cy="1485900"/>
+            <a:off x="1371600" y="685800"/>
+            <a:ext cx="9448800" cy="4482548"/>
           </a:xfrm>
         </p:spPr>
+        <p:txBody>
+          <a:bodyPr>
+            <a:normAutofit/>
+          </a:bodyPr>
+          <a:lstStyle/>
+          <a:p>
+            <a:pPr algn="ctr"/>
+            <a:br>
+              <a:rPr lang="es-AR" sz="6600" dirty="0"/>
+            </a:br>
+            <a:r>
+              <a:rPr lang="es-AR" sz="6600" dirty="0"/>
+              <a:t>¡Gracias por su atención!</a:t>
+            </a:r>
+          </a:p>
+        </p:txBody>
+      </p:sp>
+      <p:sp>
+        <p:nvSpPr>
+          <p:cNvPr id="3" name="Marcador de texto 2">
+            <a:extLst>
+              <a:ext uri="{FF2B5EF4-FFF2-40B4-BE49-F238E27FC236}">
+                <a16:creationId xmlns:a16="http://schemas.microsoft.com/office/drawing/2014/main" id="{02D5CD8F-FEC1-4110-A54D-4049809D57D8}"/>
+              </a:ext>
+            </a:extLst>
+          </p:cNvPr>
+          <p:cNvSpPr>
+            <a:spLocks noGrp="1"/>
+          </p:cNvSpPr>
+          <p:nvPr>
+            <p:ph type="body" idx="1"/>
+          </p:nvPr>
+        </p:nvSpPr>
+        <p:spPr/>
         <p:txBody>
           <a:bodyPr/>
           <a:lstStyle/>
           <a:p>
-            <a:r>
-              <a:rPr lang="es-AR" dirty="0" err="1"/>
-              <a:t>accelerometer.h</a:t>
-            </a:r>
             <a:endParaRPr lang="es-AR" dirty="0"/>
+          </a:p>
+        </p:txBody>
+      </p:sp>
+      <p:sp>
+        <p:nvSpPr>
+          <p:cNvPr id="4" name="Marcador de contenido 3">
+            <a:extLst>
+              <a:ext uri="{FF2B5EF4-FFF2-40B4-BE49-F238E27FC236}">
+                <a16:creationId xmlns:a16="http://schemas.microsoft.com/office/drawing/2014/main" id="{6ED095BB-90AB-4E8A-A337-9E92F2294999}"/>
+              </a:ext>
+            </a:extLst>
+          </p:cNvPr>
+          <p:cNvSpPr>
+            <a:spLocks noGrp="1"/>
+          </p:cNvSpPr>
+          <p:nvPr>
+            <p:ph sz="half" idx="2"/>
+          </p:nvPr>
+        </p:nvSpPr>
+        <p:spPr/>
+        <p:txBody>
+          <a:bodyPr/>
+          <a:lstStyle/>
+          <a:p>
+            <a:endParaRPr lang="es-AR"/>
+          </a:p>
+        </p:txBody>
+      </p:sp>
+      <p:sp>
+        <p:nvSpPr>
+          <p:cNvPr id="5" name="Marcador de texto 4">
+            <a:extLst>
+              <a:ext uri="{FF2B5EF4-FFF2-40B4-BE49-F238E27FC236}">
+                <a16:creationId xmlns:a16="http://schemas.microsoft.com/office/drawing/2014/main" id="{951D2D48-8476-4368-95B6-291295C6927B}"/>
+              </a:ext>
+            </a:extLst>
+          </p:cNvPr>
+          <p:cNvSpPr>
+            <a:spLocks noGrp="1"/>
+          </p:cNvSpPr>
+          <p:nvPr>
+            <p:ph type="body" sz="quarter" idx="3"/>
+          </p:nvPr>
+        </p:nvSpPr>
+        <p:spPr/>
+        <p:txBody>
+          <a:bodyPr/>
+          <a:lstStyle/>
+          <a:p>
+            <a:endParaRPr lang="es-AR"/>
+          </a:p>
+        </p:txBody>
+      </p:sp>
+      <p:sp>
+        <p:nvSpPr>
+          <p:cNvPr id="6" name="Marcador de contenido 5">
+            <a:extLst>
+              <a:ext uri="{FF2B5EF4-FFF2-40B4-BE49-F238E27FC236}">
+                <a16:creationId xmlns:a16="http://schemas.microsoft.com/office/drawing/2014/main" id="{177CD33A-DF9F-43B9-978B-A9B96271FD38}"/>
+              </a:ext>
+            </a:extLst>
+          </p:cNvPr>
+          <p:cNvSpPr>
+            <a:spLocks noGrp="1"/>
+          </p:cNvSpPr>
+          <p:nvPr>
+            <p:ph sz="quarter" idx="4"/>
+          </p:nvPr>
+        </p:nvSpPr>
+        <p:spPr/>
+        <p:txBody>
+          <a:bodyPr/>
+          <a:lstStyle/>
+          <a:p>
+            <a:endParaRPr lang="es-AR"/>
           </a:p>
         </p:txBody>
       </p:sp>
     </p:spTree>
     <p:extLst>
       <p:ext uri="{BB962C8B-B14F-4D97-AF65-F5344CB8AC3E}">
-        <p14:creationId xmlns:p14="http://schemas.microsoft.com/office/powerpoint/2010/main" val="2762447621"/>
+        <p14:creationId xmlns:p14="http://schemas.microsoft.com/office/powerpoint/2010/main" val="692921076"/>
       </p:ext>
     </p:extLst>
   </p:cSld>
@@ -15829,7 +16352,7 @@
           <p:nvPr>
             <p:extLst>
               <p:ext uri="{D42A27DB-BD31-4B8C-83A1-F6EECF244321}">
-                <p14:modId xmlns:p14="http://schemas.microsoft.com/office/powerpoint/2010/main" val="959299580"/>
+                <p14:modId xmlns:p14="http://schemas.microsoft.com/office/powerpoint/2010/main" val="596131157"/>
               </p:ext>
             </p:extLst>
           </p:nvPr>
@@ -15902,34 +16425,35 @@
           </a:p>
         </p:txBody>
       </p:sp>
-      <p:sp>
-        <p:nvSpPr>
-          <p:cNvPr id="3" name="Content Placeholder 2">
+      <p:pic>
+        <p:nvPicPr>
+          <p:cNvPr id="5" name="Marcador de contenido 4" descr="Captura de pantalla de un celular con texto&#10;&#10;Descripción generada automáticamente">
             <a:extLst>
               <a:ext uri="{FF2B5EF4-FFF2-40B4-BE49-F238E27FC236}">
-                <a16:creationId xmlns:a16="http://schemas.microsoft.com/office/drawing/2014/main" id="{602B378A-3EA1-4D37-B5C8-5E0814F1D4C6}"/>
+                <a16:creationId xmlns:a16="http://schemas.microsoft.com/office/drawing/2014/main" id="{A4665D72-83BE-4F03-A265-A0CCDFE1152E}"/>
               </a:ext>
             </a:extLst>
           </p:cNvPr>
-          <p:cNvSpPr>
-            <a:spLocks noGrp="1"/>
-          </p:cNvSpPr>
+          <p:cNvPicPr>
+            <a:picLocks noGrp="1" noChangeAspect="1"/>
+          </p:cNvPicPr>
           <p:nvPr>
             <p:ph idx="1"/>
           </p:nvPr>
-        </p:nvSpPr>
-        <p:spPr/>
-        <p:txBody>
-          <a:bodyPr/>
-          <a:lstStyle/>
-          <a:p>
-            <a:r>
-              <a:rPr lang="es-AR" dirty="0"/>
-              <a:t>ACA FOTO DEL MAIN</a:t>
-            </a:r>
-          </a:p>
-        </p:txBody>
-      </p:sp>
+        </p:nvPicPr>
+        <p:blipFill>
+          <a:blip r:embed="rId2"/>
+          <a:stretch>
+            <a:fillRect/>
+          </a:stretch>
+        </p:blipFill>
+        <p:spPr>
+          <a:xfrm>
+            <a:off x="2686929" y="1943774"/>
+            <a:ext cx="7528561" cy="5866809"/>
+          </a:xfrm>
+        </p:spPr>
+      </p:pic>
     </p:spTree>
     <p:extLst>
       <p:ext uri="{BB962C8B-B14F-4D97-AF65-F5344CB8AC3E}">
@@ -16703,6 +17227,425 @@
 <file path=ppt/slides/slide7.xml><?xml version="1.0" encoding="utf-8"?>
 <p:sld xmlns:a="http://schemas.openxmlformats.org/drawingml/2006/main" xmlns:r="http://schemas.openxmlformats.org/officeDocument/2006/relationships" xmlns:p="http://schemas.openxmlformats.org/presentationml/2006/main">
   <p:cSld>
+    <p:bg>
+      <p:bgPr>
+        <a:solidFill>
+          <a:schemeClr val="bg2"/>
+        </a:solidFill>
+        <a:effectLst/>
+      </p:bgPr>
+    </p:bg>
+    <p:spTree>
+      <p:nvGrpSpPr>
+        <p:cNvPr id="1" name=""/>
+        <p:cNvGrpSpPr/>
+        <p:nvPr/>
+      </p:nvGrpSpPr>
+      <p:grpSpPr>
+        <a:xfrm>
+          <a:off x="0" y="0"/>
+          <a:ext cx="0" cy="0"/>
+          <a:chOff x="0" y="0"/>
+          <a:chExt cx="0" cy="0"/>
+        </a:xfrm>
+      </p:grpSpPr>
+      <p:grpSp>
+        <p:nvGrpSpPr>
+          <p:cNvPr id="12" name="Group 11">
+            <a:extLst>
+              <a:ext uri="{FF2B5EF4-FFF2-40B4-BE49-F238E27FC236}">
+                <a16:creationId xmlns:a16="http://schemas.microsoft.com/office/drawing/2014/main" id="{57500303-A207-4812-BEB9-51E132FEB73F}"/>
+              </a:ext>
+              <a:ext uri="{C183D7F6-B498-43B3-948B-1728B52AA6E4}">
+                <adec:decorative xmlns:adec="http://schemas.microsoft.com/office/drawing/2017/decorative" val="1"/>
+              </a:ext>
+            </a:extLst>
+          </p:cNvPr>
+          <p:cNvGrpSpPr>
+            <a:grpSpLocks noGrp="1" noUngrp="1" noRot="1" noChangeAspect="1" noMove="1" noResize="1"/>
+          </p:cNvGrpSpPr>
+          <p:nvPr>
+            <p:extLst>
+              <p:ext uri="{386F3935-93C4-4BCD-93E2-E3B085C9AB24}">
+                <p16:designElem xmlns:p16="http://schemas.microsoft.com/office/powerpoint/2015/main" val="1"/>
+              </p:ext>
+            </p:extLst>
+          </p:nvPr>
+        </p:nvGrpSpPr>
+        <p:grpSpPr>
+          <a:xfrm>
+            <a:off x="752858" y="744469"/>
+            <a:ext cx="10674117" cy="5349671"/>
+            <a:chOff x="752858" y="744469"/>
+            <a:chExt cx="10674117" cy="5349671"/>
+          </a:xfrm>
+        </p:grpSpPr>
+        <p:sp>
+          <p:nvSpPr>
+            <p:cNvPr id="13" name="Freeform 6">
+              <a:extLst>
+                <a:ext uri="{FF2B5EF4-FFF2-40B4-BE49-F238E27FC236}">
+                  <a16:creationId xmlns:a16="http://schemas.microsoft.com/office/drawing/2014/main" id="{10118C91-C025-4776-BE95-E9926378E790}"/>
+                </a:ext>
+                <a:ext uri="{C183D7F6-B498-43B3-948B-1728B52AA6E4}">
+                  <adec:decorative xmlns:adec="http://schemas.microsoft.com/office/drawing/2017/decorative" val="1"/>
+                </a:ext>
+              </a:extLst>
+            </p:cNvPr>
+            <p:cNvSpPr/>
+            <p:nvPr>
+              <p:extLst>
+                <p:ext uri="{386F3935-93C4-4BCD-93E2-E3B085C9AB24}">
+                  <p16:designElem xmlns:p16="http://schemas.microsoft.com/office/powerpoint/2015/main" val="1"/>
+                </p:ext>
+              </p:extLst>
+            </p:nvPr>
+          </p:nvSpPr>
+          <p:spPr bwMode="auto">
+            <a:xfrm>
+              <a:off x="8151962" y="1685652"/>
+              <a:ext cx="3275013" cy="4408488"/>
+            </a:xfrm>
+            <a:custGeom>
+              <a:avLst/>
+              <a:gdLst/>
+              <a:ahLst/>
+              <a:cxnLst/>
+              <a:rect l="l" t="t" r="r" b="b"/>
+              <a:pathLst>
+                <a:path w="10000" h="10000">
+                  <a:moveTo>
+                    <a:pt x="8761" y="0"/>
+                  </a:moveTo>
+                  <a:lnTo>
+                    <a:pt x="10000" y="0"/>
+                  </a:lnTo>
+                  <a:lnTo>
+                    <a:pt x="10000" y="10000"/>
+                  </a:lnTo>
+                  <a:lnTo>
+                    <a:pt x="0" y="10000"/>
+                  </a:lnTo>
+                  <a:lnTo>
+                    <a:pt x="0" y="9126"/>
+                  </a:lnTo>
+                  <a:lnTo>
+                    <a:pt x="8761" y="9127"/>
+                  </a:lnTo>
+                  <a:lnTo>
+                    <a:pt x="8761" y="0"/>
+                  </a:lnTo>
+                  <a:close/>
+                </a:path>
+              </a:pathLst>
+            </a:custGeom>
+            <a:solidFill>
+              <a:schemeClr val="tx2"/>
+            </a:solidFill>
+            <a:ln w="0">
+              <a:noFill/>
+              <a:prstDash val="solid"/>
+              <a:round/>
+              <a:headEnd/>
+              <a:tailEnd/>
+            </a:ln>
+          </p:spPr>
+        </p:sp>
+        <p:sp>
+          <p:nvSpPr>
+            <p:cNvPr id="14" name="Freeform 6">
+              <a:extLst>
+                <a:ext uri="{FF2B5EF4-FFF2-40B4-BE49-F238E27FC236}">
+                  <a16:creationId xmlns:a16="http://schemas.microsoft.com/office/drawing/2014/main" id="{339174D0-30E8-4BBF-BF81-5DDAC33C0C0E}"/>
+                </a:ext>
+                <a:ext uri="{C183D7F6-B498-43B3-948B-1728B52AA6E4}">
+                  <adec:decorative xmlns:adec="http://schemas.microsoft.com/office/drawing/2017/decorative" val="1"/>
+                </a:ext>
+              </a:extLst>
+            </p:cNvPr>
+            <p:cNvSpPr/>
+            <p:nvPr>
+              <p:extLst>
+                <p:ext uri="{386F3935-93C4-4BCD-93E2-E3B085C9AB24}">
+                  <p16:designElem xmlns:p16="http://schemas.microsoft.com/office/powerpoint/2015/main" val="1"/>
+                </p:ext>
+              </p:extLst>
+            </p:nvPr>
+          </p:nvSpPr>
+          <p:spPr bwMode="auto">
+            <a:xfrm flipH="1" flipV="1">
+              <a:off x="752858" y="744469"/>
+              <a:ext cx="3275668" cy="4408488"/>
+            </a:xfrm>
+            <a:custGeom>
+              <a:avLst/>
+              <a:gdLst/>
+              <a:ahLst/>
+              <a:cxnLst/>
+              <a:rect l="l" t="t" r="r" b="b"/>
+              <a:pathLst>
+                <a:path w="10002" h="10000">
+                  <a:moveTo>
+                    <a:pt x="8763" y="0"/>
+                  </a:moveTo>
+                  <a:lnTo>
+                    <a:pt x="10002" y="0"/>
+                  </a:lnTo>
+                  <a:lnTo>
+                    <a:pt x="10002" y="10000"/>
+                  </a:lnTo>
+                  <a:lnTo>
+                    <a:pt x="2" y="10000"/>
+                  </a:lnTo>
+                  <a:cubicBezTo>
+                    <a:pt x="-2" y="9698"/>
+                    <a:pt x="4" y="9427"/>
+                    <a:pt x="0" y="9125"/>
+                  </a:cubicBezTo>
+                  <a:lnTo>
+                    <a:pt x="8763" y="9128"/>
+                  </a:lnTo>
+                  <a:lnTo>
+                    <a:pt x="8763" y="0"/>
+                  </a:lnTo>
+                  <a:close/>
+                </a:path>
+              </a:pathLst>
+            </a:custGeom>
+            <a:solidFill>
+              <a:schemeClr val="tx2"/>
+            </a:solidFill>
+            <a:ln w="0">
+              <a:noFill/>
+              <a:prstDash val="solid"/>
+              <a:round/>
+              <a:headEnd/>
+              <a:tailEnd/>
+            </a:ln>
+          </p:spPr>
+        </p:sp>
+      </p:grpSp>
+      <p:sp useBgFill="1">
+        <p:nvSpPr>
+          <p:cNvPr id="16" name="Rectangle 15">
+            <a:extLst>
+              <a:ext uri="{FF2B5EF4-FFF2-40B4-BE49-F238E27FC236}">
+                <a16:creationId xmlns:a16="http://schemas.microsoft.com/office/drawing/2014/main" id="{925474FA-D1AB-44FA-B3C6-06893E79923F}"/>
+              </a:ext>
+              <a:ext uri="{C183D7F6-B498-43B3-948B-1728B52AA6E4}">
+                <adec:decorative xmlns:adec="http://schemas.microsoft.com/office/drawing/2017/decorative" val="1"/>
+              </a:ext>
+            </a:extLst>
+          </p:cNvPr>
+          <p:cNvSpPr>
+            <a:spLocks noGrp="1" noRot="1" noChangeAspect="1" noMove="1" noResize="1" noEditPoints="1" noAdjustHandles="1" noChangeArrowheads="1" noChangeShapeType="1" noTextEdit="1"/>
+          </p:cNvSpPr>
+          <p:nvPr>
+            <p:extLst>
+              <p:ext uri="{386F3935-93C4-4BCD-93E2-E3B085C9AB24}">
+                <p16:designElem xmlns:p16="http://schemas.microsoft.com/office/powerpoint/2015/main" val="1"/>
+              </p:ext>
+            </p:extLst>
+          </p:nvPr>
+        </p:nvSpPr>
+        <p:spPr>
+          <a:xfrm>
+            <a:off x="0" y="0"/>
+            <a:ext cx="12192000" cy="6858000"/>
+          </a:xfrm>
+          <a:prstGeom prst="rect">
+            <a:avLst/>
+          </a:prstGeom>
+          <a:ln>
+            <a:noFill/>
+          </a:ln>
+        </p:spPr>
+        <p:style>
+          <a:lnRef idx="2">
+            <a:schemeClr val="accent1">
+              <a:shade val="50000"/>
+            </a:schemeClr>
+          </a:lnRef>
+          <a:fillRef idx="1">
+            <a:schemeClr val="accent1"/>
+          </a:fillRef>
+          <a:effectRef idx="0">
+            <a:schemeClr val="accent1"/>
+          </a:effectRef>
+          <a:fontRef idx="minor">
+            <a:schemeClr val="lt1"/>
+          </a:fontRef>
+        </p:style>
+        <p:txBody>
+          <a:bodyPr rtlCol="0" anchor="ctr"/>
+          <a:lstStyle/>
+          <a:p>
+            <a:pPr algn="ctr"/>
+            <a:endParaRPr lang="en-US"/>
+          </a:p>
+        </p:txBody>
+      </p:sp>
+      <p:sp>
+        <p:nvSpPr>
+          <p:cNvPr id="7" name="Title 3">
+            <a:extLst>
+              <a:ext uri="{FF2B5EF4-FFF2-40B4-BE49-F238E27FC236}">
+                <a16:creationId xmlns:a16="http://schemas.microsoft.com/office/drawing/2014/main" id="{232AF6AD-C5B1-4F78-B40F-4A56E0BFFE0D}"/>
+              </a:ext>
+            </a:extLst>
+          </p:cNvPr>
+          <p:cNvSpPr>
+            <a:spLocks noGrp="1"/>
+          </p:cNvSpPr>
+          <p:nvPr>
+            <p:ph type="title"/>
+          </p:nvPr>
+        </p:nvSpPr>
+        <p:spPr>
+          <a:xfrm>
+            <a:off x="1478521" y="1480930"/>
+            <a:ext cx="5678215" cy="3254321"/>
+          </a:xfrm>
+        </p:spPr>
+        <p:txBody>
+          <a:bodyPr vert="horz" lIns="91440" tIns="45720" rIns="91440" bIns="45720" rtlCol="0" anchor="b">
+            <a:normAutofit/>
+          </a:bodyPr>
+          <a:lstStyle/>
+          <a:p>
+            <a:pPr>
+              <a:lnSpc>
+                <a:spcPct val="89000"/>
+              </a:lnSpc>
+            </a:pPr>
+            <a:r>
+              <a:rPr lang="en-US" sz="5100" cap="all" dirty="0"/>
+              <a:t>U.A.R.T</a:t>
+            </a:r>
+          </a:p>
+        </p:txBody>
+      </p:sp>
+      <p:sp>
+        <p:nvSpPr>
+          <p:cNvPr id="18" name="Freeform 6">
+            <a:extLst>
+              <a:ext uri="{FF2B5EF4-FFF2-40B4-BE49-F238E27FC236}">
+                <a16:creationId xmlns:a16="http://schemas.microsoft.com/office/drawing/2014/main" id="{D6887B88-D39C-4236-B64C-7EE28DB7CDFC}"/>
+              </a:ext>
+              <a:ext uri="{C183D7F6-B498-43B3-948B-1728B52AA6E4}">
+                <adec:decorative xmlns:adec="http://schemas.microsoft.com/office/drawing/2017/decorative" val="1"/>
+              </a:ext>
+            </a:extLst>
+          </p:cNvPr>
+          <p:cNvSpPr>
+            <a:spLocks noGrp="1" noRot="1" noChangeAspect="1" noMove="1" noResize="1" noEditPoints="1" noAdjustHandles="1" noChangeArrowheads="1" noChangeShapeType="1" noTextEdit="1"/>
+          </p:cNvSpPr>
+          <p:nvPr>
+            <p:extLst>
+              <p:ext uri="{386F3935-93C4-4BCD-93E2-E3B085C9AB24}">
+                <p16:designElem xmlns:p16="http://schemas.microsoft.com/office/powerpoint/2015/main" val="1"/>
+              </p:ext>
+            </p:extLst>
+          </p:nvPr>
+        </p:nvSpPr>
+        <p:spPr bwMode="auto">
+          <a:xfrm flipH="1" flipV="1">
+            <a:off x="752858" y="744469"/>
+            <a:ext cx="3275668" cy="4408488"/>
+          </a:xfrm>
+          <a:custGeom>
+            <a:avLst/>
+            <a:gdLst/>
+            <a:ahLst/>
+            <a:cxnLst/>
+            <a:rect l="l" t="t" r="r" b="b"/>
+            <a:pathLst>
+              <a:path w="10002" h="10000">
+                <a:moveTo>
+                  <a:pt x="8763" y="0"/>
+                </a:moveTo>
+                <a:lnTo>
+                  <a:pt x="10002" y="0"/>
+                </a:lnTo>
+                <a:lnTo>
+                  <a:pt x="10002" y="10000"/>
+                </a:lnTo>
+                <a:lnTo>
+                  <a:pt x="2" y="10000"/>
+                </a:lnTo>
+                <a:cubicBezTo>
+                  <a:pt x="-2" y="9698"/>
+                  <a:pt x="4" y="9427"/>
+                  <a:pt x="0" y="9125"/>
+                </a:cubicBezTo>
+                <a:lnTo>
+                  <a:pt x="8763" y="9128"/>
+                </a:lnTo>
+                <a:lnTo>
+                  <a:pt x="8763" y="0"/>
+                </a:lnTo>
+                <a:close/>
+              </a:path>
+            </a:pathLst>
+          </a:custGeom>
+          <a:solidFill>
+            <a:schemeClr val="tx2"/>
+          </a:solidFill>
+          <a:ln w="0">
+            <a:noFill/>
+            <a:prstDash val="solid"/>
+            <a:round/>
+            <a:headEnd/>
+            <a:tailEnd/>
+          </a:ln>
+        </p:spPr>
+      </p:sp>
+      <p:pic>
+        <p:nvPicPr>
+          <p:cNvPr id="2" name="Imagen 1">
+            <a:extLst>
+              <a:ext uri="{FF2B5EF4-FFF2-40B4-BE49-F238E27FC236}">
+                <a16:creationId xmlns:a16="http://schemas.microsoft.com/office/drawing/2014/main" id="{B7ED31C5-B89A-477C-B700-0B4EAD8E9FCE}"/>
+              </a:ext>
+            </a:extLst>
+          </p:cNvPr>
+          <p:cNvPicPr>
+            <a:picLocks noChangeAspect="1"/>
+          </p:cNvPicPr>
+          <p:nvPr/>
+        </p:nvPicPr>
+        <p:blipFill>
+          <a:blip r:embed="rId2"/>
+          <a:stretch>
+            <a:fillRect/>
+          </a:stretch>
+        </p:blipFill>
+        <p:spPr>
+          <a:xfrm>
+            <a:off x="4781384" y="798150"/>
+            <a:ext cx="6880713" cy="5261699"/>
+          </a:xfrm>
+          <a:prstGeom prst="rect">
+            <a:avLst/>
+          </a:prstGeom>
+        </p:spPr>
+      </p:pic>
+    </p:spTree>
+    <p:extLst>
+      <p:ext uri="{BB962C8B-B14F-4D97-AF65-F5344CB8AC3E}">
+        <p14:creationId xmlns:p14="http://schemas.microsoft.com/office/powerpoint/2010/main" val="2762447621"/>
+      </p:ext>
+    </p:extLst>
+  </p:cSld>
+  <p:clrMapOvr>
+    <a:masterClrMapping/>
+  </p:clrMapOvr>
+</p:sld>
+</file>
+
+<file path=ppt/slides/slide8.xml><?xml version="1.0" encoding="utf-8"?>
+<p:sld xmlns:a="http://schemas.openxmlformats.org/drawingml/2006/main" xmlns:r="http://schemas.openxmlformats.org/officeDocument/2006/relationships" xmlns:p="http://schemas.openxmlformats.org/presentationml/2006/main">
+  <p:cSld>
     <p:spTree>
       <p:nvGrpSpPr>
         <p:cNvPr id="1" name=""/>
@@ -17058,7 +18001,7 @@
 </p:sld>
 </file>
 
-<file path=ppt/slides/slide8.xml><?xml version="1.0" encoding="utf-8"?>
+<file path=ppt/slides/slide9.xml><?xml version="1.0" encoding="utf-8"?>
 <p:sld xmlns:a="http://schemas.openxmlformats.org/drawingml/2006/main" xmlns:r="http://schemas.openxmlformats.org/officeDocument/2006/relationships" xmlns:p="http://schemas.openxmlformats.org/presentationml/2006/main">
   <p:cSld>
     <p:spTree>
@@ -17154,99 +18097,6 @@
     <p:extLst>
       <p:ext uri="{BB962C8B-B14F-4D97-AF65-F5344CB8AC3E}">
         <p14:creationId xmlns:p14="http://schemas.microsoft.com/office/powerpoint/2010/main" val="286731620"/>
-      </p:ext>
-    </p:extLst>
-  </p:cSld>
-  <p:clrMapOvr>
-    <a:masterClrMapping/>
-  </p:clrMapOvr>
-</p:sld>
-</file>
-
-<file path=ppt/slides/slide9.xml><?xml version="1.0" encoding="utf-8"?>
-<p:sld xmlns:a="http://schemas.openxmlformats.org/drawingml/2006/main" xmlns:r="http://schemas.openxmlformats.org/officeDocument/2006/relationships" xmlns:p="http://schemas.openxmlformats.org/presentationml/2006/main">
-  <p:cSld>
-    <p:spTree>
-      <p:nvGrpSpPr>
-        <p:cNvPr id="1" name=""/>
-        <p:cNvGrpSpPr/>
-        <p:nvPr/>
-      </p:nvGrpSpPr>
-      <p:grpSpPr>
-        <a:xfrm>
-          <a:off x="0" y="0"/>
-          <a:ext cx="0" cy="0"/>
-          <a:chOff x="0" y="0"/>
-          <a:chExt cx="0" cy="0"/>
-        </a:xfrm>
-      </p:grpSpPr>
-      <p:sp>
-        <p:nvSpPr>
-          <p:cNvPr id="7" name="Title 3">
-            <a:extLst>
-              <a:ext uri="{FF2B5EF4-FFF2-40B4-BE49-F238E27FC236}">
-                <a16:creationId xmlns:a16="http://schemas.microsoft.com/office/drawing/2014/main" id="{232AF6AD-C5B1-4F78-B40F-4A56E0BFFE0D}"/>
-              </a:ext>
-            </a:extLst>
-          </p:cNvPr>
-          <p:cNvSpPr>
-            <a:spLocks noGrp="1"/>
-          </p:cNvSpPr>
-          <p:nvPr>
-            <p:ph type="ctrTitle"/>
-          </p:nvPr>
-        </p:nvSpPr>
-        <p:spPr>
-          <a:xfrm>
-            <a:off x="4373091" y="238996"/>
-            <a:ext cx="6831673" cy="1086238"/>
-          </a:xfrm>
-        </p:spPr>
-        <p:txBody>
-          <a:bodyPr/>
-          <a:lstStyle/>
-          <a:p>
-            <a:r>
-              <a:rPr lang="es-AR" cap="none" dirty="0"/>
-              <a:t>FXOS8700CQ.h</a:t>
-            </a:r>
-          </a:p>
-        </p:txBody>
-      </p:sp>
-      <p:pic>
-        <p:nvPicPr>
-          <p:cNvPr id="2" name="Picture 1">
-            <a:extLst>
-              <a:ext uri="{FF2B5EF4-FFF2-40B4-BE49-F238E27FC236}">
-                <a16:creationId xmlns:a16="http://schemas.microsoft.com/office/drawing/2014/main" id="{4F8A8A3A-FD07-4AE3-A78E-B404D2452D8C}"/>
-              </a:ext>
-            </a:extLst>
-          </p:cNvPr>
-          <p:cNvPicPr>
-            <a:picLocks noChangeAspect="1"/>
-          </p:cNvPicPr>
-          <p:nvPr/>
-        </p:nvPicPr>
-        <p:blipFill>
-          <a:blip r:embed="rId2"/>
-          <a:stretch>
-            <a:fillRect/>
-          </a:stretch>
-        </p:blipFill>
-        <p:spPr>
-          <a:xfrm>
-            <a:off x="2631141" y="1203157"/>
-            <a:ext cx="6929717" cy="4451685"/>
-          </a:xfrm>
-          <a:prstGeom prst="rect">
-            <a:avLst/>
-          </a:prstGeom>
-        </p:spPr>
-      </p:pic>
-    </p:spTree>
-    <p:extLst>
-      <p:ext uri="{BB962C8B-B14F-4D97-AF65-F5344CB8AC3E}">
-        <p14:creationId xmlns:p14="http://schemas.microsoft.com/office/powerpoint/2010/main" val="2943568953"/>
       </p:ext>
     </p:extLst>
   </p:cSld>

</xml_diff>